<commit_message>
Update tech and tools
</commit_message>
<xml_diff>
--- a/docs/pics/illustrations/source/completeIllustration.pptx
+++ b/docs/pics/illustrations/source/completeIllustration.pptx
@@ -5,12 +5,10 @@
     <p:sldMasterId id="2147483648" r:id="rId1"/>
   </p:sldMasterIdLst>
   <p:sldIdLst>
-    <p:sldId id="256" r:id="rId2"/>
-    <p:sldId id="257" r:id="rId3"/>
-    <p:sldId id="259" r:id="rId4"/>
-    <p:sldId id="260" r:id="rId5"/>
-    <p:sldId id="258" r:id="rId6"/>
-    <p:sldId id="261" r:id="rId7"/>
+    <p:sldId id="260" r:id="rId2"/>
+    <p:sldId id="258" r:id="rId3"/>
+    <p:sldId id="261" r:id="rId4"/>
+    <p:sldId id="263" r:id="rId5"/>
   </p:sldIdLst>
   <p:sldSz cx="12192000" cy="6858000"/>
   <p:notesSz cx="6858000" cy="9144000"/>
@@ -109,6 +107,11 @@
       </a:defRPr>
     </a:lvl9pPr>
   </p:defaultTextStyle>
+  <p:extLst>
+    <p:ext uri="{EFAFB233-063F-42B5-8137-9DF3F51BA10A}">
+      <p15:sldGuideLst xmlns:p15="http://schemas.microsoft.com/office/powerpoint/2012/main"/>
+    </p:ext>
+  </p:extLst>
 </p:presentation>
 </file>
 
@@ -259,7 +262,7 @@
           <a:p>
             <a:fld id="{C1C4F7B4-8437-4340-A649-4C92A357846E}" type="datetimeFigureOut">
               <a:rPr lang="he-IL" smtClean="0"/>
-              <a:t>ב'/טבת/תשפ"ד</a:t>
+              <a:t>ג'/טבת/תשפ"ד</a:t>
             </a:fld>
             <a:endParaRPr lang="he-IL"/>
           </a:p>
@@ -457,7 +460,7 @@
           <a:p>
             <a:fld id="{C1C4F7B4-8437-4340-A649-4C92A357846E}" type="datetimeFigureOut">
               <a:rPr lang="he-IL" smtClean="0"/>
-              <a:t>ב'/טבת/תשפ"ד</a:t>
+              <a:t>ג'/טבת/תשפ"ד</a:t>
             </a:fld>
             <a:endParaRPr lang="he-IL"/>
           </a:p>
@@ -665,7 +668,7 @@
           <a:p>
             <a:fld id="{C1C4F7B4-8437-4340-A649-4C92A357846E}" type="datetimeFigureOut">
               <a:rPr lang="he-IL" smtClean="0"/>
-              <a:t>ב'/טבת/תשפ"ד</a:t>
+              <a:t>ג'/טבת/תשפ"ד</a:t>
             </a:fld>
             <a:endParaRPr lang="he-IL"/>
           </a:p>
@@ -863,7 +866,7 @@
           <a:p>
             <a:fld id="{C1C4F7B4-8437-4340-A649-4C92A357846E}" type="datetimeFigureOut">
               <a:rPr lang="he-IL" smtClean="0"/>
-              <a:t>ב'/טבת/תשפ"ד</a:t>
+              <a:t>ג'/טבת/תשפ"ד</a:t>
             </a:fld>
             <a:endParaRPr lang="he-IL"/>
           </a:p>
@@ -1138,7 +1141,7 @@
           <a:p>
             <a:fld id="{C1C4F7B4-8437-4340-A649-4C92A357846E}" type="datetimeFigureOut">
               <a:rPr lang="he-IL" smtClean="0"/>
-              <a:t>ב'/טבת/תשפ"ד</a:t>
+              <a:t>ג'/טבת/תשפ"ד</a:t>
             </a:fld>
             <a:endParaRPr lang="he-IL"/>
           </a:p>
@@ -1403,7 +1406,7 @@
           <a:p>
             <a:fld id="{C1C4F7B4-8437-4340-A649-4C92A357846E}" type="datetimeFigureOut">
               <a:rPr lang="he-IL" smtClean="0"/>
-              <a:t>ב'/טבת/תשפ"ד</a:t>
+              <a:t>ג'/טבת/תשפ"ד</a:t>
             </a:fld>
             <a:endParaRPr lang="he-IL"/>
           </a:p>
@@ -1815,7 +1818,7 @@
           <a:p>
             <a:fld id="{C1C4F7B4-8437-4340-A649-4C92A357846E}" type="datetimeFigureOut">
               <a:rPr lang="he-IL" smtClean="0"/>
-              <a:t>ב'/טבת/תשפ"ד</a:t>
+              <a:t>ג'/טבת/תשפ"ד</a:t>
             </a:fld>
             <a:endParaRPr lang="he-IL"/>
           </a:p>
@@ -1956,7 +1959,7 @@
           <a:p>
             <a:fld id="{C1C4F7B4-8437-4340-A649-4C92A357846E}" type="datetimeFigureOut">
               <a:rPr lang="he-IL" smtClean="0"/>
-              <a:t>ב'/טבת/תשפ"ד</a:t>
+              <a:t>ג'/טבת/תשפ"ד</a:t>
             </a:fld>
             <a:endParaRPr lang="he-IL"/>
           </a:p>
@@ -2069,7 +2072,7 @@
           <a:p>
             <a:fld id="{C1C4F7B4-8437-4340-A649-4C92A357846E}" type="datetimeFigureOut">
               <a:rPr lang="he-IL" smtClean="0"/>
-              <a:t>ב'/טבת/תשפ"ד</a:t>
+              <a:t>ג'/טבת/תשפ"ד</a:t>
             </a:fld>
             <a:endParaRPr lang="he-IL"/>
           </a:p>
@@ -2380,7 +2383,7 @@
           <a:p>
             <a:fld id="{C1C4F7B4-8437-4340-A649-4C92A357846E}" type="datetimeFigureOut">
               <a:rPr lang="he-IL" smtClean="0"/>
-              <a:t>ב'/טבת/תשפ"ד</a:t>
+              <a:t>ג'/טבת/תשפ"ד</a:t>
             </a:fld>
             <a:endParaRPr lang="he-IL"/>
           </a:p>
@@ -2668,7 +2671,7 @@
           <a:p>
             <a:fld id="{C1C4F7B4-8437-4340-A649-4C92A357846E}" type="datetimeFigureOut">
               <a:rPr lang="he-IL" smtClean="0"/>
-              <a:t>ב'/טבת/תשפ"ד</a:t>
+              <a:t>ג'/טבת/תשפ"ד</a:t>
             </a:fld>
             <a:endParaRPr lang="he-IL"/>
           </a:p>
@@ -2909,7 +2912,7 @@
           <a:p>
             <a:fld id="{C1C4F7B4-8437-4340-A649-4C92A357846E}" type="datetimeFigureOut">
               <a:rPr lang="he-IL" smtClean="0"/>
-              <a:t>ב'/טבת/תשפ"ד</a:t>
+              <a:t>ג'/טבת/תשפ"ד</a:t>
             </a:fld>
             <a:endParaRPr lang="he-IL"/>
           </a:p>
@@ -3326,2368 +3329,6 @@
           <a:chExt cx="0" cy="0"/>
         </a:xfrm>
       </p:grpSpPr>
-      <p:sp>
-        <p:nvSpPr>
-          <p:cNvPr id="23" name="צורה חופשית: צורה 22">
-            <a:extLst>
-              <a:ext uri="{FF2B5EF4-FFF2-40B4-BE49-F238E27FC236}">
-                <a16:creationId xmlns:a16="http://schemas.microsoft.com/office/drawing/2014/main" id="{ECE25987-4947-6A06-01E6-C000AA785A43}"/>
-              </a:ext>
-            </a:extLst>
-          </p:cNvPr>
-          <p:cNvSpPr/>
-          <p:nvPr/>
-        </p:nvSpPr>
-        <p:spPr>
-          <a:xfrm>
-            <a:off x="953885" y="1908422"/>
-            <a:ext cx="9627132" cy="3201941"/>
-          </a:xfrm>
-          <a:custGeom>
-            <a:avLst/>
-            <a:gdLst>
-              <a:gd name="connsiteX0" fmla="*/ 119541 w 9627132"/>
-              <a:gd name="connsiteY0" fmla="*/ 512753 h 3224474"/>
-              <a:gd name="connsiteX1" fmla="*/ 40028 w 9627132"/>
-              <a:gd name="connsiteY1" fmla="*/ 1864475 h 3224474"/>
-              <a:gd name="connsiteX2" fmla="*/ 676132 w 9627132"/>
-              <a:gd name="connsiteY2" fmla="*/ 3057171 h 3224474"/>
-              <a:gd name="connsiteX3" fmla="*/ 2889245 w 9627132"/>
-              <a:gd name="connsiteY3" fmla="*/ 3202945 h 3224474"/>
-              <a:gd name="connsiteX4" fmla="*/ 3207298 w 9627132"/>
-              <a:gd name="connsiteY4" fmla="*/ 2937901 h 3224474"/>
-              <a:gd name="connsiteX5" fmla="*/ 2186880 w 9627132"/>
-              <a:gd name="connsiteY5" fmla="*/ 1572927 h 3224474"/>
-              <a:gd name="connsiteX6" fmla="*/ 1696550 w 9627132"/>
-              <a:gd name="connsiteY6" fmla="*/ 539258 h 3224474"/>
-              <a:gd name="connsiteX7" fmla="*/ 2465176 w 9627132"/>
-              <a:gd name="connsiteY7" fmla="*/ 194701 h 3224474"/>
-              <a:gd name="connsiteX8" fmla="*/ 4002428 w 9627132"/>
-              <a:gd name="connsiteY8" fmla="*/ 313971 h 3224474"/>
-              <a:gd name="connsiteX9" fmla="*/ 4081941 w 9627132"/>
-              <a:gd name="connsiteY9" fmla="*/ 1254875 h 3224474"/>
-              <a:gd name="connsiteX10" fmla="*/ 3618115 w 9627132"/>
-              <a:gd name="connsiteY10" fmla="*/ 1692197 h 3224474"/>
-              <a:gd name="connsiteX11" fmla="*/ 3578358 w 9627132"/>
-              <a:gd name="connsiteY11" fmla="*/ 2659606 h 3224474"/>
-              <a:gd name="connsiteX12" fmla="*/ 5062602 w 9627132"/>
-              <a:gd name="connsiteY12" fmla="*/ 2964406 h 3224474"/>
-              <a:gd name="connsiteX13" fmla="*/ 5725211 w 9627132"/>
-              <a:gd name="connsiteY13" fmla="*/ 2089762 h 3224474"/>
-              <a:gd name="connsiteX14" fmla="*/ 4930080 w 9627132"/>
-              <a:gd name="connsiteY14" fmla="*/ 923571 h 3224474"/>
-              <a:gd name="connsiteX15" fmla="*/ 4545767 w 9627132"/>
-              <a:gd name="connsiteY15" fmla="*/ 446493 h 3224474"/>
-              <a:gd name="connsiteX16" fmla="*/ 5619193 w 9627132"/>
-              <a:gd name="connsiteY16" fmla="*/ 221206 h 3224474"/>
-              <a:gd name="connsiteX17" fmla="*/ 6666115 w 9627132"/>
-              <a:gd name="connsiteY17" fmla="*/ 154945 h 3224474"/>
-              <a:gd name="connsiteX18" fmla="*/ 6321558 w 9627132"/>
-              <a:gd name="connsiteY18" fmla="*/ 2394562 h 3224474"/>
-              <a:gd name="connsiteX19" fmla="*/ 6891402 w 9627132"/>
-              <a:gd name="connsiteY19" fmla="*/ 2831884 h 3224474"/>
-              <a:gd name="connsiteX20" fmla="*/ 8057593 w 9627132"/>
-              <a:gd name="connsiteY20" fmla="*/ 2765623 h 3224474"/>
-              <a:gd name="connsiteX21" fmla="*/ 8309385 w 9627132"/>
-              <a:gd name="connsiteY21" fmla="*/ 2447571 h 3224474"/>
-              <a:gd name="connsiteX22" fmla="*/ 8243124 w 9627132"/>
-              <a:gd name="connsiteY22" fmla="*/ 1824719 h 3224474"/>
-              <a:gd name="connsiteX23" fmla="*/ 7421489 w 9627132"/>
-              <a:gd name="connsiteY23" fmla="*/ 963327 h 3224474"/>
-              <a:gd name="connsiteX24" fmla="*/ 7540758 w 9627132"/>
-              <a:gd name="connsiteY24" fmla="*/ 207953 h 3224474"/>
-              <a:gd name="connsiteX25" fmla="*/ 9541837 w 9627132"/>
-              <a:gd name="connsiteY25" fmla="*/ 168197 h 3224474"/>
-              <a:gd name="connsiteX26" fmla="*/ 9237037 w 9627132"/>
-              <a:gd name="connsiteY26" fmla="*/ 1612684 h 3224474"/>
-              <a:gd name="connsiteX27" fmla="*/ 9038254 w 9627132"/>
-              <a:gd name="connsiteY27" fmla="*/ 2818632 h 3224474"/>
-              <a:gd name="connsiteX28" fmla="*/ 9581593 w 9627132"/>
-              <a:gd name="connsiteY28" fmla="*/ 2898145 h 3224474"/>
-            </a:gdLst>
-            <a:ahLst/>
-            <a:cxnLst>
-              <a:cxn ang="0">
-                <a:pos x="connsiteX0" y="connsiteY0"/>
-              </a:cxn>
-              <a:cxn ang="0">
-                <a:pos x="connsiteX1" y="connsiteY1"/>
-              </a:cxn>
-              <a:cxn ang="0">
-                <a:pos x="connsiteX2" y="connsiteY2"/>
-              </a:cxn>
-              <a:cxn ang="0">
-                <a:pos x="connsiteX3" y="connsiteY3"/>
-              </a:cxn>
-              <a:cxn ang="0">
-                <a:pos x="connsiteX4" y="connsiteY4"/>
-              </a:cxn>
-              <a:cxn ang="0">
-                <a:pos x="connsiteX5" y="connsiteY5"/>
-              </a:cxn>
-              <a:cxn ang="0">
-                <a:pos x="connsiteX6" y="connsiteY6"/>
-              </a:cxn>
-              <a:cxn ang="0">
-                <a:pos x="connsiteX7" y="connsiteY7"/>
-              </a:cxn>
-              <a:cxn ang="0">
-                <a:pos x="connsiteX8" y="connsiteY8"/>
-              </a:cxn>
-              <a:cxn ang="0">
-                <a:pos x="connsiteX9" y="connsiteY9"/>
-              </a:cxn>
-              <a:cxn ang="0">
-                <a:pos x="connsiteX10" y="connsiteY10"/>
-              </a:cxn>
-              <a:cxn ang="0">
-                <a:pos x="connsiteX11" y="connsiteY11"/>
-              </a:cxn>
-              <a:cxn ang="0">
-                <a:pos x="connsiteX12" y="connsiteY12"/>
-              </a:cxn>
-              <a:cxn ang="0">
-                <a:pos x="connsiteX13" y="connsiteY13"/>
-              </a:cxn>
-              <a:cxn ang="0">
-                <a:pos x="connsiteX14" y="connsiteY14"/>
-              </a:cxn>
-              <a:cxn ang="0">
-                <a:pos x="connsiteX15" y="connsiteY15"/>
-              </a:cxn>
-              <a:cxn ang="0">
-                <a:pos x="connsiteX16" y="connsiteY16"/>
-              </a:cxn>
-              <a:cxn ang="0">
-                <a:pos x="connsiteX17" y="connsiteY17"/>
-              </a:cxn>
-              <a:cxn ang="0">
-                <a:pos x="connsiteX18" y="connsiteY18"/>
-              </a:cxn>
-              <a:cxn ang="0">
-                <a:pos x="connsiteX19" y="connsiteY19"/>
-              </a:cxn>
-              <a:cxn ang="0">
-                <a:pos x="connsiteX20" y="connsiteY20"/>
-              </a:cxn>
-              <a:cxn ang="0">
-                <a:pos x="connsiteX21" y="connsiteY21"/>
-              </a:cxn>
-              <a:cxn ang="0">
-                <a:pos x="connsiteX22" y="connsiteY22"/>
-              </a:cxn>
-              <a:cxn ang="0">
-                <a:pos x="connsiteX23" y="connsiteY23"/>
-              </a:cxn>
-              <a:cxn ang="0">
-                <a:pos x="connsiteX24" y="connsiteY24"/>
-              </a:cxn>
-              <a:cxn ang="0">
-                <a:pos x="connsiteX25" y="connsiteY25"/>
-              </a:cxn>
-              <a:cxn ang="0">
-                <a:pos x="connsiteX26" y="connsiteY26"/>
-              </a:cxn>
-              <a:cxn ang="0">
-                <a:pos x="connsiteX27" y="connsiteY27"/>
-              </a:cxn>
-              <a:cxn ang="0">
-                <a:pos x="connsiteX28" y="connsiteY28"/>
-              </a:cxn>
-            </a:cxnLst>
-            <a:rect l="l" t="t" r="r" b="b"/>
-            <a:pathLst>
-              <a:path w="9627132" h="3224474">
-                <a:moveTo>
-                  <a:pt x="119541" y="512753"/>
-                </a:moveTo>
-                <a:cubicBezTo>
-                  <a:pt x="33402" y="976579"/>
-                  <a:pt x="-52737" y="1440406"/>
-                  <a:pt x="40028" y="1864475"/>
-                </a:cubicBezTo>
-                <a:cubicBezTo>
-                  <a:pt x="132793" y="2288544"/>
-                  <a:pt x="201263" y="2834093"/>
-                  <a:pt x="676132" y="3057171"/>
-                </a:cubicBezTo>
-                <a:cubicBezTo>
-                  <a:pt x="1151001" y="3280249"/>
-                  <a:pt x="2467384" y="3222823"/>
-                  <a:pt x="2889245" y="3202945"/>
-                </a:cubicBezTo>
-                <a:cubicBezTo>
-                  <a:pt x="3311106" y="3183067"/>
-                  <a:pt x="3324359" y="3209571"/>
-                  <a:pt x="3207298" y="2937901"/>
-                </a:cubicBezTo>
-                <a:cubicBezTo>
-                  <a:pt x="3090237" y="2666231"/>
-                  <a:pt x="2438671" y="1972701"/>
-                  <a:pt x="2186880" y="1572927"/>
-                </a:cubicBezTo>
-                <a:cubicBezTo>
-                  <a:pt x="1935089" y="1173153"/>
-                  <a:pt x="1650167" y="768962"/>
-                  <a:pt x="1696550" y="539258"/>
-                </a:cubicBezTo>
-                <a:cubicBezTo>
-                  <a:pt x="1742933" y="309554"/>
-                  <a:pt x="2080863" y="232249"/>
-                  <a:pt x="2465176" y="194701"/>
-                </a:cubicBezTo>
-                <a:cubicBezTo>
-                  <a:pt x="2849489" y="157153"/>
-                  <a:pt x="3732967" y="137275"/>
-                  <a:pt x="4002428" y="313971"/>
-                </a:cubicBezTo>
-                <a:cubicBezTo>
-                  <a:pt x="4271889" y="490667"/>
-                  <a:pt x="4145993" y="1025171"/>
-                  <a:pt x="4081941" y="1254875"/>
-                </a:cubicBezTo>
-                <a:cubicBezTo>
-                  <a:pt x="4017889" y="1484579"/>
-                  <a:pt x="3702045" y="1458075"/>
-                  <a:pt x="3618115" y="1692197"/>
-                </a:cubicBezTo>
-                <a:cubicBezTo>
-                  <a:pt x="3534185" y="1926319"/>
-                  <a:pt x="3337610" y="2447571"/>
-                  <a:pt x="3578358" y="2659606"/>
-                </a:cubicBezTo>
-                <a:cubicBezTo>
-                  <a:pt x="3819106" y="2871641"/>
-                  <a:pt x="4704793" y="3059380"/>
-                  <a:pt x="5062602" y="2964406"/>
-                </a:cubicBezTo>
-                <a:cubicBezTo>
-                  <a:pt x="5420411" y="2869432"/>
-                  <a:pt x="5747298" y="2429901"/>
-                  <a:pt x="5725211" y="2089762"/>
-                </a:cubicBezTo>
-                <a:cubicBezTo>
-                  <a:pt x="5703124" y="1749623"/>
-                  <a:pt x="5126654" y="1197449"/>
-                  <a:pt x="4930080" y="923571"/>
-                </a:cubicBezTo>
-                <a:cubicBezTo>
-                  <a:pt x="4733506" y="649693"/>
-                  <a:pt x="4430915" y="563554"/>
-                  <a:pt x="4545767" y="446493"/>
-                </a:cubicBezTo>
-                <a:cubicBezTo>
-                  <a:pt x="4660619" y="329432"/>
-                  <a:pt x="5265802" y="269797"/>
-                  <a:pt x="5619193" y="221206"/>
-                </a:cubicBezTo>
-                <a:cubicBezTo>
-                  <a:pt x="5972584" y="172615"/>
-                  <a:pt x="6549054" y="-207281"/>
-                  <a:pt x="6666115" y="154945"/>
-                </a:cubicBezTo>
-                <a:cubicBezTo>
-                  <a:pt x="6783176" y="517171"/>
-                  <a:pt x="6284010" y="1948406"/>
-                  <a:pt x="6321558" y="2394562"/>
-                </a:cubicBezTo>
-                <a:cubicBezTo>
-                  <a:pt x="6359106" y="2840718"/>
-                  <a:pt x="6602063" y="2770041"/>
-                  <a:pt x="6891402" y="2831884"/>
-                </a:cubicBezTo>
-                <a:cubicBezTo>
-                  <a:pt x="7180741" y="2893728"/>
-                  <a:pt x="7821262" y="2829675"/>
-                  <a:pt x="8057593" y="2765623"/>
-                </a:cubicBezTo>
-                <a:cubicBezTo>
-                  <a:pt x="8293924" y="2701571"/>
-                  <a:pt x="8278463" y="2604388"/>
-                  <a:pt x="8309385" y="2447571"/>
-                </a:cubicBezTo>
-                <a:cubicBezTo>
-                  <a:pt x="8340307" y="2290754"/>
-                  <a:pt x="8391107" y="2072093"/>
-                  <a:pt x="8243124" y="1824719"/>
-                </a:cubicBezTo>
-                <a:cubicBezTo>
-                  <a:pt x="8095141" y="1577345"/>
-                  <a:pt x="7538550" y="1232788"/>
-                  <a:pt x="7421489" y="963327"/>
-                </a:cubicBezTo>
-                <a:cubicBezTo>
-                  <a:pt x="7304428" y="693866"/>
-                  <a:pt x="7187367" y="340475"/>
-                  <a:pt x="7540758" y="207953"/>
-                </a:cubicBezTo>
-                <a:cubicBezTo>
-                  <a:pt x="7894149" y="75431"/>
-                  <a:pt x="9259124" y="-65925"/>
-                  <a:pt x="9541837" y="168197"/>
-                </a:cubicBezTo>
-                <a:cubicBezTo>
-                  <a:pt x="9824550" y="402319"/>
-                  <a:pt x="9320968" y="1170945"/>
-                  <a:pt x="9237037" y="1612684"/>
-                </a:cubicBezTo>
-                <a:cubicBezTo>
-                  <a:pt x="9153106" y="2054423"/>
-                  <a:pt x="8980828" y="2604389"/>
-                  <a:pt x="9038254" y="2818632"/>
-                </a:cubicBezTo>
-                <a:cubicBezTo>
-                  <a:pt x="9095680" y="3032875"/>
-                  <a:pt x="9338636" y="2965510"/>
-                  <a:pt x="9581593" y="2898145"/>
-                </a:cubicBezTo>
-              </a:path>
-            </a:pathLst>
-          </a:custGeom>
-          <a:noFill/>
-          <a:ln>
-            <a:solidFill>
-              <a:schemeClr val="accent1"/>
-            </a:solidFill>
-          </a:ln>
-        </p:spPr>
-        <p:style>
-          <a:lnRef idx="2">
-            <a:schemeClr val="accent1">
-              <a:shade val="15000"/>
-            </a:schemeClr>
-          </a:lnRef>
-          <a:fillRef idx="1">
-            <a:schemeClr val="accent1"/>
-          </a:fillRef>
-          <a:effectRef idx="0">
-            <a:schemeClr val="accent1"/>
-          </a:effectRef>
-          <a:fontRef idx="minor">
-            <a:schemeClr val="lt1"/>
-          </a:fontRef>
-        </p:style>
-        <p:txBody>
-          <a:bodyPr rtlCol="1" anchor="ctr"/>
-          <a:lstStyle/>
-          <a:p>
-            <a:pPr algn="ctr"/>
-            <a:endParaRPr lang="he-IL"/>
-          </a:p>
-        </p:txBody>
-      </p:sp>
-      <p:sp>
-        <p:nvSpPr>
-          <p:cNvPr id="5" name="תיבת טקסט 4">
-            <a:extLst>
-              <a:ext uri="{FF2B5EF4-FFF2-40B4-BE49-F238E27FC236}">
-                <a16:creationId xmlns:a16="http://schemas.microsoft.com/office/drawing/2014/main" id="{C0BF8F2E-F962-48D5-052F-F0A26625A5D7}"/>
-              </a:ext>
-            </a:extLst>
-          </p:cNvPr>
-          <p:cNvSpPr txBox="1"/>
-          <p:nvPr/>
-        </p:nvSpPr>
-        <p:spPr>
-          <a:xfrm>
-            <a:off x="-21156" y="2046922"/>
-            <a:ext cx="2321682" cy="369332"/>
-          </a:xfrm>
-          <a:prstGeom prst="rect">
-            <a:avLst/>
-          </a:prstGeom>
-          <a:solidFill>
-            <a:schemeClr val="bg1"/>
-          </a:solidFill>
-        </p:spPr>
-        <p:txBody>
-          <a:bodyPr wrap="square">
-            <a:spAutoFit/>
-          </a:bodyPr>
-          <a:lstStyle/>
-          <a:p>
-            <a:pPr algn="ctr"/>
-            <a:r>
-              <a:rPr lang="de-DE" i="0" dirty="0">
-                <a:solidFill>
-                  <a:srgbClr val="1F2328"/>
-                </a:solidFill>
-                <a:effectLst/>
-                <a:latin typeface="Aptos" panose="020B0004020202020204" pitchFamily="34" charset="0"/>
-              </a:rPr>
-              <a:t>Model Training</a:t>
-            </a:r>
-            <a:endParaRPr lang="he-IL" dirty="0">
-              <a:latin typeface="Aptos" panose="020B0004020202020204" pitchFamily="34" charset="0"/>
-            </a:endParaRPr>
-          </a:p>
-        </p:txBody>
-      </p:sp>
-      <p:sp>
-        <p:nvSpPr>
-          <p:cNvPr id="7" name="תיבת טקסט 6">
-            <a:extLst>
-              <a:ext uri="{FF2B5EF4-FFF2-40B4-BE49-F238E27FC236}">
-                <a16:creationId xmlns:a16="http://schemas.microsoft.com/office/drawing/2014/main" id="{FB1E60C8-3014-32CE-5860-60D14110E76A}"/>
-              </a:ext>
-            </a:extLst>
-          </p:cNvPr>
-          <p:cNvSpPr txBox="1"/>
-          <p:nvPr/>
-        </p:nvSpPr>
-        <p:spPr>
-          <a:xfrm>
-            <a:off x="1636642" y="4031975"/>
-            <a:ext cx="2321682" cy="1477328"/>
-          </a:xfrm>
-          <a:prstGeom prst="rect">
-            <a:avLst/>
-          </a:prstGeom>
-          <a:solidFill>
-            <a:schemeClr val="bg1"/>
-          </a:solidFill>
-        </p:spPr>
-        <p:txBody>
-          <a:bodyPr wrap="square">
-            <a:spAutoFit/>
-          </a:bodyPr>
-          <a:lstStyle/>
-          <a:p>
-            <a:pPr algn="ctr"/>
-            <a:r>
-              <a:rPr lang="en-US" i="0" dirty="0">
-                <a:solidFill>
-                  <a:srgbClr val="1F2328"/>
-                </a:solidFill>
-                <a:effectLst/>
-                <a:latin typeface="Aptos" panose="020B0004020202020204" pitchFamily="34" charset="0"/>
-              </a:rPr>
-              <a:t>Building the </a:t>
-            </a:r>
-            <a:br>
-              <a:rPr lang="en-US" i="0" dirty="0">
-                <a:solidFill>
-                  <a:srgbClr val="1F2328"/>
-                </a:solidFill>
-                <a:effectLst/>
-                <a:latin typeface="Aptos" panose="020B0004020202020204" pitchFamily="34" charset="0"/>
-              </a:rPr>
-            </a:br>
-            <a:r>
-              <a:rPr lang="en-US" i="0" dirty="0">
-                <a:solidFill>
-                  <a:srgbClr val="1F2328"/>
-                </a:solidFill>
-                <a:effectLst/>
-                <a:latin typeface="Aptos" panose="020B0004020202020204" pitchFamily="34" charset="0"/>
-              </a:rPr>
-              <a:t>End-to-End Application Architecture for Using the Model</a:t>
-            </a:r>
-            <a:endParaRPr lang="he-IL" dirty="0">
-              <a:latin typeface="Aptos" panose="020B0004020202020204" pitchFamily="34" charset="0"/>
-            </a:endParaRPr>
-          </a:p>
-        </p:txBody>
-      </p:sp>
-      <p:sp>
-        <p:nvSpPr>
-          <p:cNvPr id="9" name="תיבת טקסט 8">
-            <a:extLst>
-              <a:ext uri="{FF2B5EF4-FFF2-40B4-BE49-F238E27FC236}">
-                <a16:creationId xmlns:a16="http://schemas.microsoft.com/office/drawing/2014/main" id="{453DF033-F0C2-2E31-EBEC-0F2DE7B0E200}"/>
-              </a:ext>
-            </a:extLst>
-          </p:cNvPr>
-          <p:cNvSpPr txBox="1"/>
-          <p:nvPr/>
-        </p:nvSpPr>
-        <p:spPr>
-          <a:xfrm>
-            <a:off x="2728346" y="1769923"/>
-            <a:ext cx="2321682" cy="923330"/>
-          </a:xfrm>
-          <a:prstGeom prst="rect">
-            <a:avLst/>
-          </a:prstGeom>
-          <a:solidFill>
-            <a:schemeClr val="bg1"/>
-          </a:solidFill>
-        </p:spPr>
-        <p:txBody>
-          <a:bodyPr wrap="square">
-            <a:spAutoFit/>
-          </a:bodyPr>
-          <a:lstStyle/>
-          <a:p>
-            <a:pPr algn="ctr"/>
-            <a:r>
-              <a:rPr lang="de-DE" i="0" dirty="0">
-                <a:solidFill>
-                  <a:srgbClr val="1F2328"/>
-                </a:solidFill>
-                <a:effectLst/>
-                <a:latin typeface="Aptos" panose="020B0004020202020204" pitchFamily="34" charset="0"/>
-              </a:rPr>
-              <a:t>Implementing Continuous Integration Practices</a:t>
-            </a:r>
-            <a:endParaRPr lang="he-IL" dirty="0">
-              <a:latin typeface="Aptos" panose="020B0004020202020204" pitchFamily="34" charset="0"/>
-            </a:endParaRPr>
-          </a:p>
-        </p:txBody>
-      </p:sp>
-      <p:sp>
-        <p:nvSpPr>
-          <p:cNvPr id="11" name="תיבת טקסט 10">
-            <a:extLst>
-              <a:ext uri="{FF2B5EF4-FFF2-40B4-BE49-F238E27FC236}">
-                <a16:creationId xmlns:a16="http://schemas.microsoft.com/office/drawing/2014/main" id="{EFA7D353-DCDB-90D5-C325-621252A5055E}"/>
-              </a:ext>
-            </a:extLst>
-          </p:cNvPr>
-          <p:cNvSpPr txBox="1"/>
-          <p:nvPr/>
-        </p:nvSpPr>
-        <p:spPr>
-          <a:xfrm>
-            <a:off x="4346712" y="4447474"/>
-            <a:ext cx="2321682" cy="646331"/>
-          </a:xfrm>
-          <a:prstGeom prst="rect">
-            <a:avLst/>
-          </a:prstGeom>
-          <a:solidFill>
-            <a:schemeClr val="bg1"/>
-          </a:solidFill>
-        </p:spPr>
-        <p:txBody>
-          <a:bodyPr wrap="square">
-            <a:spAutoFit/>
-          </a:bodyPr>
-          <a:lstStyle/>
-          <a:p>
-            <a:pPr algn="ctr"/>
-            <a:r>
-              <a:rPr lang="en-US" i="0" dirty="0">
-                <a:solidFill>
-                  <a:srgbClr val="1F2328"/>
-                </a:solidFill>
-                <a:effectLst/>
-                <a:latin typeface="Aptos" panose="020B0004020202020204" pitchFamily="34" charset="0"/>
-              </a:rPr>
-              <a:t>Exposing an API Using Swagger</a:t>
-            </a:r>
-            <a:endParaRPr lang="he-IL" dirty="0">
-              <a:latin typeface="Aptos" panose="020B0004020202020204" pitchFamily="34" charset="0"/>
-            </a:endParaRPr>
-          </a:p>
-        </p:txBody>
-      </p:sp>
-      <p:sp>
-        <p:nvSpPr>
-          <p:cNvPr id="13" name="תיבת טקסט 12">
-            <a:extLst>
-              <a:ext uri="{FF2B5EF4-FFF2-40B4-BE49-F238E27FC236}">
-                <a16:creationId xmlns:a16="http://schemas.microsoft.com/office/drawing/2014/main" id="{EFC6A3E4-3E6D-4314-41A5-C81316224D68}"/>
-              </a:ext>
-            </a:extLst>
-          </p:cNvPr>
-          <p:cNvSpPr txBox="1"/>
-          <p:nvPr/>
-        </p:nvSpPr>
-        <p:spPr>
-          <a:xfrm>
-            <a:off x="5477848" y="1908423"/>
-            <a:ext cx="2321682" cy="646331"/>
-          </a:xfrm>
-          <a:prstGeom prst="rect">
-            <a:avLst/>
-          </a:prstGeom>
-          <a:solidFill>
-            <a:schemeClr val="bg1"/>
-          </a:solidFill>
-        </p:spPr>
-        <p:txBody>
-          <a:bodyPr wrap="square">
-            <a:spAutoFit/>
-          </a:bodyPr>
-          <a:lstStyle/>
-          <a:p>
-            <a:pPr algn="ctr"/>
-            <a:r>
-              <a:rPr lang="de-DE" i="0" dirty="0">
-                <a:solidFill>
-                  <a:srgbClr val="1F2328"/>
-                </a:solidFill>
-                <a:effectLst/>
-                <a:latin typeface="Aptos" panose="020B0004020202020204" pitchFamily="34" charset="0"/>
-              </a:rPr>
-              <a:t>Build and Deployment</a:t>
-            </a:r>
-            <a:endParaRPr lang="he-IL" dirty="0">
-              <a:latin typeface="Aptos" panose="020B0004020202020204" pitchFamily="34" charset="0"/>
-            </a:endParaRPr>
-          </a:p>
-        </p:txBody>
-      </p:sp>
-      <p:sp>
-        <p:nvSpPr>
-          <p:cNvPr id="15" name="תיבת טקסט 14">
-            <a:extLst>
-              <a:ext uri="{FF2B5EF4-FFF2-40B4-BE49-F238E27FC236}">
-                <a16:creationId xmlns:a16="http://schemas.microsoft.com/office/drawing/2014/main" id="{61C88B26-1490-5E97-AA81-9CC62F1E2ADF}"/>
-              </a:ext>
-            </a:extLst>
-          </p:cNvPr>
-          <p:cNvSpPr txBox="1"/>
-          <p:nvPr/>
-        </p:nvSpPr>
-        <p:spPr>
-          <a:xfrm>
-            <a:off x="7056782" y="4308974"/>
-            <a:ext cx="2321682" cy="923330"/>
-          </a:xfrm>
-          <a:prstGeom prst="rect">
-            <a:avLst/>
-          </a:prstGeom>
-          <a:solidFill>
-            <a:schemeClr val="bg1"/>
-          </a:solidFill>
-        </p:spPr>
-        <p:txBody>
-          <a:bodyPr wrap="square">
-            <a:spAutoFit/>
-          </a:bodyPr>
-          <a:lstStyle/>
-          <a:p>
-            <a:pPr algn="ctr"/>
-            <a:r>
-              <a:rPr lang="en-US" i="0" dirty="0">
-                <a:solidFill>
-                  <a:srgbClr val="1F2328"/>
-                </a:solidFill>
-                <a:effectLst/>
-                <a:latin typeface="Aptos" panose="020B0004020202020204" pitchFamily="34" charset="0"/>
-              </a:rPr>
-              <a:t>Cloud Integration (Exploring Google Cloud)</a:t>
-            </a:r>
-            <a:endParaRPr lang="he-IL" dirty="0">
-              <a:latin typeface="Aptos" panose="020B0004020202020204" pitchFamily="34" charset="0"/>
-            </a:endParaRPr>
-          </a:p>
-        </p:txBody>
-      </p:sp>
-      <p:sp>
-        <p:nvSpPr>
-          <p:cNvPr id="17" name="תיבת טקסט 16">
-            <a:extLst>
-              <a:ext uri="{FF2B5EF4-FFF2-40B4-BE49-F238E27FC236}">
-                <a16:creationId xmlns:a16="http://schemas.microsoft.com/office/drawing/2014/main" id="{6A774A82-22C4-1745-360B-EDD2C3632BF5}"/>
-              </a:ext>
-            </a:extLst>
-          </p:cNvPr>
-          <p:cNvSpPr txBox="1"/>
-          <p:nvPr/>
-        </p:nvSpPr>
-        <p:spPr>
-          <a:xfrm>
-            <a:off x="8227349" y="1769923"/>
-            <a:ext cx="2425148" cy="923330"/>
-          </a:xfrm>
-          <a:prstGeom prst="rect">
-            <a:avLst/>
-          </a:prstGeom>
-          <a:solidFill>
-            <a:schemeClr val="bg1"/>
-          </a:solidFill>
-        </p:spPr>
-        <p:txBody>
-          <a:bodyPr wrap="square">
-            <a:spAutoFit/>
-          </a:bodyPr>
-          <a:lstStyle/>
-          <a:p>
-            <a:pPr algn="ctr"/>
-            <a:r>
-              <a:rPr lang="en-US" i="0" dirty="0">
-                <a:solidFill>
-                  <a:srgbClr val="1F2328"/>
-                </a:solidFill>
-                <a:effectLst/>
-                <a:latin typeface="Aptos" panose="020B0004020202020204" pitchFamily="34" charset="0"/>
-              </a:rPr>
-              <a:t>Automated Cloud Deployment Using Terraform</a:t>
-            </a:r>
-            <a:endParaRPr lang="he-IL" dirty="0">
-              <a:latin typeface="Aptos" panose="020B0004020202020204" pitchFamily="34" charset="0"/>
-            </a:endParaRPr>
-          </a:p>
-        </p:txBody>
-      </p:sp>
-      <p:sp>
-        <p:nvSpPr>
-          <p:cNvPr id="18" name="תיבת טקסט 17">
-            <a:extLst>
-              <a:ext uri="{FF2B5EF4-FFF2-40B4-BE49-F238E27FC236}">
-                <a16:creationId xmlns:a16="http://schemas.microsoft.com/office/drawing/2014/main" id="{B927CD92-DE29-42F1-1B36-0FDA3CDCB64C}"/>
-              </a:ext>
-            </a:extLst>
-          </p:cNvPr>
-          <p:cNvSpPr txBox="1"/>
-          <p:nvPr/>
-        </p:nvSpPr>
-        <p:spPr>
-          <a:xfrm>
-            <a:off x="9766852" y="4447474"/>
-            <a:ext cx="2425148" cy="646331"/>
-          </a:xfrm>
-          <a:prstGeom prst="rect">
-            <a:avLst/>
-          </a:prstGeom>
-          <a:solidFill>
-            <a:schemeClr val="bg1"/>
-          </a:solidFill>
-        </p:spPr>
-        <p:txBody>
-          <a:bodyPr wrap="square">
-            <a:spAutoFit/>
-          </a:bodyPr>
-          <a:lstStyle/>
-          <a:p>
-            <a:pPr algn="ctr"/>
-            <a:r>
-              <a:rPr lang="en-US" i="0" dirty="0">
-                <a:solidFill>
-                  <a:srgbClr val="1F2328"/>
-                </a:solidFill>
-                <a:effectLst/>
-                <a:latin typeface="Aptos" panose="020B0004020202020204" pitchFamily="34" charset="0"/>
-              </a:rPr>
-              <a:t>Documentation</a:t>
-            </a:r>
-            <a:br>
-              <a:rPr lang="en-US" i="0" dirty="0">
-                <a:solidFill>
-                  <a:srgbClr val="1F2328"/>
-                </a:solidFill>
-                <a:effectLst/>
-                <a:latin typeface="Aptos" panose="020B0004020202020204" pitchFamily="34" charset="0"/>
-              </a:rPr>
-            </a:br>
-            <a:r>
-              <a:rPr lang="en-US" i="0" dirty="0">
-                <a:solidFill>
-                  <a:srgbClr val="1F2328"/>
-                </a:solidFill>
-                <a:effectLst/>
-                <a:latin typeface="Aptos" panose="020B0004020202020204" pitchFamily="34" charset="0"/>
-              </a:rPr>
-              <a:t>and Summary</a:t>
-            </a:r>
-            <a:endParaRPr lang="he-IL" dirty="0">
-              <a:latin typeface="Aptos" panose="020B0004020202020204" pitchFamily="34" charset="0"/>
-            </a:endParaRPr>
-          </a:p>
-        </p:txBody>
-      </p:sp>
-    </p:spTree>
-    <p:extLst>
-      <p:ext uri="{BB962C8B-B14F-4D97-AF65-F5344CB8AC3E}">
-        <p14:creationId xmlns:p14="http://schemas.microsoft.com/office/powerpoint/2010/main" val="3119557946"/>
-      </p:ext>
-    </p:extLst>
-  </p:cSld>
-  <p:clrMapOvr>
-    <a:masterClrMapping/>
-  </p:clrMapOvr>
-</p:sld>
-</file>
-
-<file path=ppt/slides/slide2.xml><?xml version="1.0" encoding="utf-8"?>
-<p:sld xmlns:a="http://schemas.openxmlformats.org/drawingml/2006/main" xmlns:r="http://schemas.openxmlformats.org/officeDocument/2006/relationships" xmlns:p="http://schemas.openxmlformats.org/presentationml/2006/main">
-  <p:cSld>
-    <p:spTree>
-      <p:nvGrpSpPr>
-        <p:cNvPr id="1" name=""/>
-        <p:cNvGrpSpPr/>
-        <p:nvPr/>
-      </p:nvGrpSpPr>
-      <p:grpSpPr>
-        <a:xfrm>
-          <a:off x="0" y="0"/>
-          <a:ext cx="0" cy="0"/>
-          <a:chOff x="0" y="0"/>
-          <a:chExt cx="0" cy="0"/>
-        </a:xfrm>
-      </p:grpSpPr>
-      <p:pic>
-        <p:nvPicPr>
-          <p:cNvPr id="43" name="תמונה 42" descr="תמונה שמכילה שרטוט, ציור, אומנות ילדים, אומנות קווים&#10;&#10;התיאור נוצר באופן אוטומטי">
-            <a:extLst>
-              <a:ext uri="{FF2B5EF4-FFF2-40B4-BE49-F238E27FC236}">
-                <a16:creationId xmlns:a16="http://schemas.microsoft.com/office/drawing/2014/main" id="{599D53EE-A7F5-62A6-C9DA-3B2D211A0142}"/>
-              </a:ext>
-            </a:extLst>
-          </p:cNvPr>
-          <p:cNvPicPr>
-            <a:picLocks noChangeAspect="1"/>
-          </p:cNvPicPr>
-          <p:nvPr/>
-        </p:nvPicPr>
-        <p:blipFill rotWithShape="1">
-          <a:blip r:embed="rId2">
-            <a:extLst>
-              <a:ext uri="{28A0092B-C50C-407E-A947-70E740481C1C}">
-                <a14:useLocalDpi xmlns:a14="http://schemas.microsoft.com/office/drawing/2010/main" val="0"/>
-              </a:ext>
-            </a:extLst>
-          </a:blip>
-          <a:srcRect t="8335" r="53308"/>
-          <a:stretch/>
-        </p:blipFill>
-        <p:spPr>
-          <a:xfrm>
-            <a:off x="5339985" y="4610559"/>
-            <a:ext cx="898969" cy="1366607"/>
-          </a:xfrm>
-          <a:prstGeom prst="rect">
-            <a:avLst/>
-          </a:prstGeom>
-        </p:spPr>
-      </p:pic>
-      <p:pic>
-        <p:nvPicPr>
-          <p:cNvPr id="35" name="תמונה 34" descr="תמונה שמכילה שרטוט, ציור, אומנות ילדים, אומנות קווים&#10;&#10;התיאור נוצר באופן אוטומטי">
-            <a:extLst>
-              <a:ext uri="{FF2B5EF4-FFF2-40B4-BE49-F238E27FC236}">
-                <a16:creationId xmlns:a16="http://schemas.microsoft.com/office/drawing/2014/main" id="{A944BE94-600E-58E3-BFD1-809569B64D6E}"/>
-              </a:ext>
-            </a:extLst>
-          </p:cNvPr>
-          <p:cNvPicPr>
-            <a:picLocks noChangeAspect="1"/>
-          </p:cNvPicPr>
-          <p:nvPr/>
-        </p:nvPicPr>
-        <p:blipFill>
-          <a:blip r:embed="rId3">
-            <a:extLst>
-              <a:ext uri="{28A0092B-C50C-407E-A947-70E740481C1C}">
-                <a14:useLocalDpi xmlns:a14="http://schemas.microsoft.com/office/drawing/2010/main" val="0"/>
-              </a:ext>
-            </a:extLst>
-          </a:blip>
-          <a:stretch>
-            <a:fillRect/>
-          </a:stretch>
-        </p:blipFill>
-        <p:spPr>
-          <a:xfrm>
-            <a:off x="10508798" y="2975387"/>
-            <a:ext cx="941256" cy="1171632"/>
-          </a:xfrm>
-          <a:prstGeom prst="rect">
-            <a:avLst/>
-          </a:prstGeom>
-        </p:spPr>
-      </p:pic>
-      <p:pic>
-        <p:nvPicPr>
-          <p:cNvPr id="36" name="תמונה 35" descr="תמונה שמכילה שרטוט, ציור, אומנות קווים, אומנות ילדים&#10;&#10;התיאור נוצר באופן אוטומטי">
-            <a:extLst>
-              <a:ext uri="{FF2B5EF4-FFF2-40B4-BE49-F238E27FC236}">
-                <a16:creationId xmlns:a16="http://schemas.microsoft.com/office/drawing/2014/main" id="{01EC1526-143A-DF2A-3FE9-4A49D717A9F7}"/>
-              </a:ext>
-            </a:extLst>
-          </p:cNvPr>
-          <p:cNvPicPr>
-            <a:picLocks noChangeAspect="1"/>
-          </p:cNvPicPr>
-          <p:nvPr/>
-        </p:nvPicPr>
-        <p:blipFill>
-          <a:blip r:embed="rId4">
-            <a:extLst>
-              <a:ext uri="{28A0092B-C50C-407E-A947-70E740481C1C}">
-                <a14:useLocalDpi xmlns:a14="http://schemas.microsoft.com/office/drawing/2010/main" val="0"/>
-              </a:ext>
-            </a:extLst>
-          </a:blip>
-          <a:stretch>
-            <a:fillRect/>
-          </a:stretch>
-        </p:blipFill>
-        <p:spPr>
-          <a:xfrm>
-            <a:off x="173605" y="1351227"/>
-            <a:ext cx="1655426" cy="1168342"/>
-          </a:xfrm>
-          <a:prstGeom prst="rect">
-            <a:avLst/>
-          </a:prstGeom>
-        </p:spPr>
-      </p:pic>
-      <p:pic>
-        <p:nvPicPr>
-          <p:cNvPr id="37" name="תמונה 36" descr="תמונה שמכילה ציור, שרטוט, אומנות קווים, אומנות ילדים&#10;&#10;התיאור נוצר באופן אוטומטי">
-            <a:extLst>
-              <a:ext uri="{FF2B5EF4-FFF2-40B4-BE49-F238E27FC236}">
-                <a16:creationId xmlns:a16="http://schemas.microsoft.com/office/drawing/2014/main" id="{A32B99FC-A2D1-80C0-2CB2-86AC76B94D23}"/>
-              </a:ext>
-            </a:extLst>
-          </p:cNvPr>
-          <p:cNvPicPr>
-            <a:picLocks noChangeAspect="1"/>
-          </p:cNvPicPr>
-          <p:nvPr/>
-        </p:nvPicPr>
-        <p:blipFill>
-          <a:blip r:embed="rId5">
-            <a:extLst>
-              <a:ext uri="{28A0092B-C50C-407E-A947-70E740481C1C}">
-                <a14:useLocalDpi xmlns:a14="http://schemas.microsoft.com/office/drawing/2010/main" val="0"/>
-              </a:ext>
-            </a:extLst>
-          </a:blip>
-          <a:stretch>
-            <a:fillRect/>
-          </a:stretch>
-        </p:blipFill>
-        <p:spPr>
-          <a:xfrm>
-            <a:off x="1434154" y="3192452"/>
-            <a:ext cx="779992" cy="1787070"/>
-          </a:xfrm>
-          <a:prstGeom prst="rect">
-            <a:avLst/>
-          </a:prstGeom>
-        </p:spPr>
-      </p:pic>
-      <p:pic>
-        <p:nvPicPr>
-          <p:cNvPr id="38" name="תמונה 37" descr="תמונה שמכילה שרטוט, ציור, אומנות קווים, איור&#10;&#10;התיאור נוצר באופן אוטומטי">
-            <a:extLst>
-              <a:ext uri="{FF2B5EF4-FFF2-40B4-BE49-F238E27FC236}">
-                <a16:creationId xmlns:a16="http://schemas.microsoft.com/office/drawing/2014/main" id="{E81B6086-FDC9-6340-25E8-A7CE777587D4}"/>
-              </a:ext>
-            </a:extLst>
-          </p:cNvPr>
-          <p:cNvPicPr>
-            <a:picLocks noChangeAspect="1"/>
-          </p:cNvPicPr>
-          <p:nvPr/>
-        </p:nvPicPr>
-        <p:blipFill>
-          <a:blip r:embed="rId6">
-            <a:extLst>
-              <a:ext uri="{28A0092B-C50C-407E-A947-70E740481C1C}">
-                <a14:useLocalDpi xmlns:a14="http://schemas.microsoft.com/office/drawing/2010/main" val="0"/>
-              </a:ext>
-            </a:extLst>
-          </a:blip>
-          <a:stretch>
-            <a:fillRect/>
-          </a:stretch>
-        </p:blipFill>
-        <p:spPr>
-          <a:xfrm>
-            <a:off x="3103554" y="773638"/>
-            <a:ext cx="1596186" cy="1155178"/>
-          </a:xfrm>
-          <a:prstGeom prst="rect">
-            <a:avLst/>
-          </a:prstGeom>
-        </p:spPr>
-      </p:pic>
-      <p:pic>
-        <p:nvPicPr>
-          <p:cNvPr id="39" name="תמונה 38" descr="תמונה שמכילה שרטוט, ציור, אומנות ילדים, אומנות קווים&#10;&#10;התיאור נוצר באופן אוטומטי">
-            <a:extLst>
-              <a:ext uri="{FF2B5EF4-FFF2-40B4-BE49-F238E27FC236}">
-                <a16:creationId xmlns:a16="http://schemas.microsoft.com/office/drawing/2014/main" id="{8A749E62-C00D-3308-C13C-36B1DC429CC2}"/>
-              </a:ext>
-            </a:extLst>
-          </p:cNvPr>
-          <p:cNvPicPr>
-            <a:picLocks noChangeAspect="1"/>
-          </p:cNvPicPr>
-          <p:nvPr/>
-        </p:nvPicPr>
-        <p:blipFill rotWithShape="1">
-          <a:blip r:embed="rId2">
-            <a:extLst>
-              <a:ext uri="{28A0092B-C50C-407E-A947-70E740481C1C}">
-                <a14:useLocalDpi xmlns:a14="http://schemas.microsoft.com/office/drawing/2010/main" val="0"/>
-              </a:ext>
-            </a:extLst>
-          </a:blip>
-          <a:srcRect l="47651"/>
-          <a:stretch/>
-        </p:blipFill>
-        <p:spPr>
-          <a:xfrm>
-            <a:off x="6223600" y="4246603"/>
-            <a:ext cx="1007874" cy="1490870"/>
-          </a:xfrm>
-          <a:prstGeom prst="rect">
-            <a:avLst/>
-          </a:prstGeom>
-        </p:spPr>
-      </p:pic>
-      <p:pic>
-        <p:nvPicPr>
-          <p:cNvPr id="40" name="תמונה 39" descr="תמונה שמכילה שרטוט, ציור, אומנות ילדים, אומנות קווים&#10;&#10;התיאור נוצר באופן אוטומטי">
-            <a:extLst>
-              <a:ext uri="{FF2B5EF4-FFF2-40B4-BE49-F238E27FC236}">
-                <a16:creationId xmlns:a16="http://schemas.microsoft.com/office/drawing/2014/main" id="{1A5C1675-1A4F-27AE-549E-18EFA562529C}"/>
-              </a:ext>
-            </a:extLst>
-          </p:cNvPr>
-          <p:cNvPicPr>
-            <a:picLocks noChangeAspect="1"/>
-          </p:cNvPicPr>
-          <p:nvPr/>
-        </p:nvPicPr>
-        <p:blipFill>
-          <a:blip r:embed="rId7">
-            <a:extLst>
-              <a:ext uri="{28A0092B-C50C-407E-A947-70E740481C1C}">
-                <a14:useLocalDpi xmlns:a14="http://schemas.microsoft.com/office/drawing/2010/main" val="0"/>
-              </a:ext>
-            </a:extLst>
-          </a:blip>
-          <a:stretch>
-            <a:fillRect/>
-          </a:stretch>
-        </p:blipFill>
-        <p:spPr>
-          <a:xfrm>
-            <a:off x="6167782" y="961424"/>
-            <a:ext cx="1079482" cy="1280240"/>
-          </a:xfrm>
-          <a:prstGeom prst="rect">
-            <a:avLst/>
-          </a:prstGeom>
-        </p:spPr>
-      </p:pic>
-      <p:pic>
-        <p:nvPicPr>
-          <p:cNvPr id="41" name="תמונה 40" descr="תמונה שמכילה ציור, שרטוט, אומנות ילדים, אומנות קווים&#10;&#10;התיאור נוצר באופן אוטומטי">
-            <a:extLst>
-              <a:ext uri="{FF2B5EF4-FFF2-40B4-BE49-F238E27FC236}">
-                <a16:creationId xmlns:a16="http://schemas.microsoft.com/office/drawing/2014/main" id="{91F449AB-D365-EC30-4742-1A726F2BF08E}"/>
-              </a:ext>
-            </a:extLst>
-          </p:cNvPr>
-          <p:cNvPicPr>
-            <a:picLocks noChangeAspect="1"/>
-          </p:cNvPicPr>
-          <p:nvPr/>
-        </p:nvPicPr>
-        <p:blipFill>
-          <a:blip r:embed="rId8">
-            <a:extLst>
-              <a:ext uri="{28A0092B-C50C-407E-A947-70E740481C1C}">
-                <a14:useLocalDpi xmlns:a14="http://schemas.microsoft.com/office/drawing/2010/main" val="0"/>
-              </a:ext>
-            </a:extLst>
-          </a:blip>
-          <a:stretch>
-            <a:fillRect/>
-          </a:stretch>
-        </p:blipFill>
-        <p:spPr>
-          <a:xfrm>
-            <a:off x="8545282" y="4610559"/>
-            <a:ext cx="1717958" cy="1217710"/>
-          </a:xfrm>
-          <a:prstGeom prst="rect">
-            <a:avLst/>
-          </a:prstGeom>
-        </p:spPr>
-      </p:pic>
-      <p:pic>
-        <p:nvPicPr>
-          <p:cNvPr id="42" name="תמונה 41" descr="תמונה שמכילה שרטוט, ציור, אומנות ילדים, אומנות קווים&#10;&#10;התיאור נוצר באופן אוטומטי">
-            <a:extLst>
-              <a:ext uri="{FF2B5EF4-FFF2-40B4-BE49-F238E27FC236}">
-                <a16:creationId xmlns:a16="http://schemas.microsoft.com/office/drawing/2014/main" id="{67D72FEA-28DE-7373-AB2C-A7FA12FEBDFC}"/>
-              </a:ext>
-            </a:extLst>
-          </p:cNvPr>
-          <p:cNvPicPr>
-            <a:picLocks noChangeAspect="1"/>
-          </p:cNvPicPr>
-          <p:nvPr/>
-        </p:nvPicPr>
-        <p:blipFill>
-          <a:blip r:embed="rId9">
-            <a:extLst>
-              <a:ext uri="{28A0092B-C50C-407E-A947-70E740481C1C}">
-                <a14:useLocalDpi xmlns:a14="http://schemas.microsoft.com/office/drawing/2010/main" val="0"/>
-              </a:ext>
-            </a:extLst>
-          </a:blip>
-          <a:stretch>
-            <a:fillRect/>
-          </a:stretch>
-        </p:blipFill>
-        <p:spPr>
-          <a:xfrm>
-            <a:off x="8715306" y="570901"/>
-            <a:ext cx="1326314" cy="1497452"/>
-          </a:xfrm>
-          <a:prstGeom prst="rect">
-            <a:avLst/>
-          </a:prstGeom>
-        </p:spPr>
-      </p:pic>
-      <p:sp>
-        <p:nvSpPr>
-          <p:cNvPr id="5" name="תיבת טקסט 4">
-            <a:extLst>
-              <a:ext uri="{FF2B5EF4-FFF2-40B4-BE49-F238E27FC236}">
-                <a16:creationId xmlns:a16="http://schemas.microsoft.com/office/drawing/2014/main" id="{C0BF8F2E-F962-48D5-052F-F0A26625A5D7}"/>
-              </a:ext>
-            </a:extLst>
-          </p:cNvPr>
-          <p:cNvSpPr txBox="1"/>
-          <p:nvPr/>
-        </p:nvSpPr>
-        <p:spPr>
-          <a:xfrm>
-            <a:off x="-21156" y="2463621"/>
-            <a:ext cx="2321682" cy="369332"/>
-          </a:xfrm>
-          <a:prstGeom prst="rect">
-            <a:avLst/>
-          </a:prstGeom>
-          <a:noFill/>
-        </p:spPr>
-        <p:txBody>
-          <a:bodyPr wrap="square">
-            <a:spAutoFit/>
-          </a:bodyPr>
-          <a:lstStyle/>
-          <a:p>
-            <a:pPr algn="ctr" rtl="0"/>
-            <a:r>
-              <a:rPr lang="de-DE" i="0" dirty="0">
-                <a:solidFill>
-                  <a:srgbClr val="1F2328"/>
-                </a:solidFill>
-                <a:effectLst/>
-                <a:latin typeface="Aptos" panose="020B0004020202020204" pitchFamily="34" charset="0"/>
-              </a:rPr>
-              <a:t>Model Training</a:t>
-            </a:r>
-            <a:endParaRPr lang="he-IL" dirty="0">
-              <a:latin typeface="Aptos" panose="020B0004020202020204" pitchFamily="34" charset="0"/>
-            </a:endParaRPr>
-          </a:p>
-        </p:txBody>
-      </p:sp>
-      <p:sp>
-        <p:nvSpPr>
-          <p:cNvPr id="7" name="תיבת טקסט 6">
-            <a:extLst>
-              <a:ext uri="{FF2B5EF4-FFF2-40B4-BE49-F238E27FC236}">
-                <a16:creationId xmlns:a16="http://schemas.microsoft.com/office/drawing/2014/main" id="{FB1E60C8-3014-32CE-5860-60D14110E76A}"/>
-              </a:ext>
-            </a:extLst>
-          </p:cNvPr>
-          <p:cNvSpPr txBox="1"/>
-          <p:nvPr/>
-        </p:nvSpPr>
-        <p:spPr>
-          <a:xfrm>
-            <a:off x="1636642" y="4031975"/>
-            <a:ext cx="2321682" cy="1477328"/>
-          </a:xfrm>
-          <a:prstGeom prst="rect">
-            <a:avLst/>
-          </a:prstGeom>
-          <a:noFill/>
-        </p:spPr>
-        <p:txBody>
-          <a:bodyPr wrap="square">
-            <a:spAutoFit/>
-          </a:bodyPr>
-          <a:lstStyle/>
-          <a:p>
-            <a:pPr algn="ctr" rtl="0"/>
-            <a:r>
-              <a:rPr lang="en-US" i="0" dirty="0">
-                <a:solidFill>
-                  <a:srgbClr val="1F2328"/>
-                </a:solidFill>
-                <a:effectLst/>
-                <a:latin typeface="Aptos" panose="020B0004020202020204" pitchFamily="34" charset="0"/>
-              </a:rPr>
-              <a:t>Building the </a:t>
-            </a:r>
-            <a:br>
-              <a:rPr lang="en-US" i="0" dirty="0">
-                <a:solidFill>
-                  <a:srgbClr val="1F2328"/>
-                </a:solidFill>
-                <a:effectLst/>
-                <a:latin typeface="Aptos" panose="020B0004020202020204" pitchFamily="34" charset="0"/>
-              </a:rPr>
-            </a:br>
-            <a:r>
-              <a:rPr lang="en-US" i="0" dirty="0">
-                <a:solidFill>
-                  <a:srgbClr val="1F2328"/>
-                </a:solidFill>
-                <a:effectLst/>
-                <a:latin typeface="Aptos" panose="020B0004020202020204" pitchFamily="34" charset="0"/>
-              </a:rPr>
-              <a:t>End-to-End Application Architecture for Using the Model</a:t>
-            </a:r>
-            <a:endParaRPr lang="he-IL" dirty="0">
-              <a:latin typeface="Aptos" panose="020B0004020202020204" pitchFamily="34" charset="0"/>
-            </a:endParaRPr>
-          </a:p>
-        </p:txBody>
-      </p:sp>
-      <p:sp>
-        <p:nvSpPr>
-          <p:cNvPr id="9" name="תיבת טקסט 8">
-            <a:extLst>
-              <a:ext uri="{FF2B5EF4-FFF2-40B4-BE49-F238E27FC236}">
-                <a16:creationId xmlns:a16="http://schemas.microsoft.com/office/drawing/2014/main" id="{453DF033-F0C2-2E31-EBEC-0F2DE7B0E200}"/>
-              </a:ext>
-            </a:extLst>
-          </p:cNvPr>
-          <p:cNvSpPr txBox="1"/>
-          <p:nvPr/>
-        </p:nvSpPr>
-        <p:spPr>
-          <a:xfrm>
-            <a:off x="2728346" y="1909623"/>
-            <a:ext cx="2321682" cy="923330"/>
-          </a:xfrm>
-          <a:prstGeom prst="rect">
-            <a:avLst/>
-          </a:prstGeom>
-          <a:noFill/>
-        </p:spPr>
-        <p:txBody>
-          <a:bodyPr wrap="square">
-            <a:spAutoFit/>
-          </a:bodyPr>
-          <a:lstStyle/>
-          <a:p>
-            <a:pPr algn="ctr" rtl="0"/>
-            <a:r>
-              <a:rPr lang="de-DE" i="0" dirty="0">
-                <a:solidFill>
-                  <a:srgbClr val="1F2328"/>
-                </a:solidFill>
-                <a:effectLst/>
-                <a:latin typeface="Aptos" panose="020B0004020202020204" pitchFamily="34" charset="0"/>
-              </a:rPr>
-              <a:t>Implementing Continuous Integration Practices</a:t>
-            </a:r>
-            <a:endParaRPr lang="he-IL" dirty="0">
-              <a:latin typeface="Aptos" panose="020B0004020202020204" pitchFamily="34" charset="0"/>
-            </a:endParaRPr>
-          </a:p>
-        </p:txBody>
-      </p:sp>
-      <p:sp>
-        <p:nvSpPr>
-          <p:cNvPr id="11" name="תיבת טקסט 10">
-            <a:extLst>
-              <a:ext uri="{FF2B5EF4-FFF2-40B4-BE49-F238E27FC236}">
-                <a16:creationId xmlns:a16="http://schemas.microsoft.com/office/drawing/2014/main" id="{EFA7D353-DCDB-90D5-C325-621252A5055E}"/>
-              </a:ext>
-            </a:extLst>
-          </p:cNvPr>
-          <p:cNvSpPr txBox="1"/>
-          <p:nvPr/>
-        </p:nvSpPr>
-        <p:spPr>
-          <a:xfrm>
-            <a:off x="4346712" y="4031975"/>
-            <a:ext cx="2321682" cy="646331"/>
-          </a:xfrm>
-          <a:prstGeom prst="rect">
-            <a:avLst/>
-          </a:prstGeom>
-          <a:noFill/>
-        </p:spPr>
-        <p:txBody>
-          <a:bodyPr wrap="square">
-            <a:spAutoFit/>
-          </a:bodyPr>
-          <a:lstStyle/>
-          <a:p>
-            <a:pPr algn="ctr" rtl="0"/>
-            <a:r>
-              <a:rPr lang="en-US" i="0" dirty="0">
-                <a:solidFill>
-                  <a:srgbClr val="1F2328"/>
-                </a:solidFill>
-                <a:effectLst/>
-                <a:latin typeface="Aptos" panose="020B0004020202020204" pitchFamily="34" charset="0"/>
-              </a:rPr>
-              <a:t>Exposing an API Using Swagger</a:t>
-            </a:r>
-            <a:endParaRPr lang="he-IL" dirty="0">
-              <a:latin typeface="Aptos" panose="020B0004020202020204" pitchFamily="34" charset="0"/>
-            </a:endParaRPr>
-          </a:p>
-        </p:txBody>
-      </p:sp>
-      <p:sp>
-        <p:nvSpPr>
-          <p:cNvPr id="13" name="תיבת טקסט 12">
-            <a:extLst>
-              <a:ext uri="{FF2B5EF4-FFF2-40B4-BE49-F238E27FC236}">
-                <a16:creationId xmlns:a16="http://schemas.microsoft.com/office/drawing/2014/main" id="{EFC6A3E4-3E6D-4314-41A5-C81316224D68}"/>
-              </a:ext>
-            </a:extLst>
-          </p:cNvPr>
-          <p:cNvSpPr txBox="1"/>
-          <p:nvPr/>
-        </p:nvSpPr>
-        <p:spPr>
-          <a:xfrm>
-            <a:off x="5477848" y="2186622"/>
-            <a:ext cx="2321682" cy="646331"/>
-          </a:xfrm>
-          <a:prstGeom prst="rect">
-            <a:avLst/>
-          </a:prstGeom>
-          <a:noFill/>
-        </p:spPr>
-        <p:txBody>
-          <a:bodyPr wrap="square">
-            <a:spAutoFit/>
-          </a:bodyPr>
-          <a:lstStyle/>
-          <a:p>
-            <a:pPr algn="ctr" rtl="0"/>
-            <a:r>
-              <a:rPr lang="de-DE" i="0" dirty="0">
-                <a:solidFill>
-                  <a:srgbClr val="1F2328"/>
-                </a:solidFill>
-                <a:effectLst/>
-                <a:latin typeface="Aptos" panose="020B0004020202020204" pitchFamily="34" charset="0"/>
-              </a:rPr>
-              <a:t>Build and Deployment</a:t>
-            </a:r>
-            <a:endParaRPr lang="he-IL" dirty="0">
-              <a:latin typeface="Aptos" panose="020B0004020202020204" pitchFamily="34" charset="0"/>
-            </a:endParaRPr>
-          </a:p>
-        </p:txBody>
-      </p:sp>
-      <p:sp>
-        <p:nvSpPr>
-          <p:cNvPr id="15" name="תיבת טקסט 14">
-            <a:extLst>
-              <a:ext uri="{FF2B5EF4-FFF2-40B4-BE49-F238E27FC236}">
-                <a16:creationId xmlns:a16="http://schemas.microsoft.com/office/drawing/2014/main" id="{61C88B26-1490-5E97-AA81-9CC62F1E2ADF}"/>
-              </a:ext>
-            </a:extLst>
-          </p:cNvPr>
-          <p:cNvSpPr txBox="1"/>
-          <p:nvPr/>
-        </p:nvSpPr>
-        <p:spPr>
-          <a:xfrm>
-            <a:off x="7056782" y="4031975"/>
-            <a:ext cx="2321682" cy="923330"/>
-          </a:xfrm>
-          <a:prstGeom prst="rect">
-            <a:avLst/>
-          </a:prstGeom>
-          <a:noFill/>
-        </p:spPr>
-        <p:txBody>
-          <a:bodyPr wrap="square">
-            <a:spAutoFit/>
-          </a:bodyPr>
-          <a:lstStyle/>
-          <a:p>
-            <a:pPr algn="ctr" rtl="0"/>
-            <a:r>
-              <a:rPr lang="en-US" i="0" dirty="0">
-                <a:solidFill>
-                  <a:srgbClr val="1F2328"/>
-                </a:solidFill>
-                <a:effectLst/>
-                <a:latin typeface="Aptos" panose="020B0004020202020204" pitchFamily="34" charset="0"/>
-              </a:rPr>
-              <a:t>Cloud Integration (Exploring Google Cloud)</a:t>
-            </a:r>
-            <a:endParaRPr lang="he-IL" dirty="0">
-              <a:latin typeface="Aptos" panose="020B0004020202020204" pitchFamily="34" charset="0"/>
-            </a:endParaRPr>
-          </a:p>
-        </p:txBody>
-      </p:sp>
-      <p:sp>
-        <p:nvSpPr>
-          <p:cNvPr id="17" name="תיבת טקסט 16">
-            <a:extLst>
-              <a:ext uri="{FF2B5EF4-FFF2-40B4-BE49-F238E27FC236}">
-                <a16:creationId xmlns:a16="http://schemas.microsoft.com/office/drawing/2014/main" id="{6A774A82-22C4-1745-360B-EDD2C3632BF5}"/>
-              </a:ext>
-            </a:extLst>
-          </p:cNvPr>
-          <p:cNvSpPr txBox="1"/>
-          <p:nvPr/>
-        </p:nvSpPr>
-        <p:spPr>
-          <a:xfrm>
-            <a:off x="8227349" y="1909623"/>
-            <a:ext cx="2425148" cy="923330"/>
-          </a:xfrm>
-          <a:prstGeom prst="rect">
-            <a:avLst/>
-          </a:prstGeom>
-          <a:noFill/>
-        </p:spPr>
-        <p:txBody>
-          <a:bodyPr wrap="square">
-            <a:spAutoFit/>
-          </a:bodyPr>
-          <a:lstStyle/>
-          <a:p>
-            <a:pPr algn="ctr" rtl="0"/>
-            <a:r>
-              <a:rPr lang="en-US" i="0" dirty="0">
-                <a:solidFill>
-                  <a:srgbClr val="1F2328"/>
-                </a:solidFill>
-                <a:effectLst/>
-                <a:latin typeface="Aptos" panose="020B0004020202020204" pitchFamily="34" charset="0"/>
-              </a:rPr>
-              <a:t>Automated Cloud Deployment Using Terraform</a:t>
-            </a:r>
-            <a:endParaRPr lang="he-IL" dirty="0">
-              <a:latin typeface="Aptos" panose="020B0004020202020204" pitchFamily="34" charset="0"/>
-            </a:endParaRPr>
-          </a:p>
-        </p:txBody>
-      </p:sp>
-      <p:sp>
-        <p:nvSpPr>
-          <p:cNvPr id="18" name="תיבת טקסט 17">
-            <a:extLst>
-              <a:ext uri="{FF2B5EF4-FFF2-40B4-BE49-F238E27FC236}">
-                <a16:creationId xmlns:a16="http://schemas.microsoft.com/office/drawing/2014/main" id="{B927CD92-DE29-42F1-1B36-0FDA3CDCB64C}"/>
-              </a:ext>
-            </a:extLst>
-          </p:cNvPr>
-          <p:cNvSpPr txBox="1"/>
-          <p:nvPr/>
-        </p:nvSpPr>
-        <p:spPr>
-          <a:xfrm>
-            <a:off x="9766852" y="4031975"/>
-            <a:ext cx="2425148" cy="646331"/>
-          </a:xfrm>
-          <a:prstGeom prst="rect">
-            <a:avLst/>
-          </a:prstGeom>
-          <a:noFill/>
-        </p:spPr>
-        <p:txBody>
-          <a:bodyPr wrap="square">
-            <a:spAutoFit/>
-          </a:bodyPr>
-          <a:lstStyle/>
-          <a:p>
-            <a:pPr algn="ctr" rtl="0"/>
-            <a:r>
-              <a:rPr lang="en-US" i="0" dirty="0">
-                <a:solidFill>
-                  <a:srgbClr val="1F2328"/>
-                </a:solidFill>
-                <a:effectLst/>
-                <a:latin typeface="Aptos" panose="020B0004020202020204" pitchFamily="34" charset="0"/>
-              </a:rPr>
-              <a:t>Documentation</a:t>
-            </a:r>
-            <a:br>
-              <a:rPr lang="en-US" i="0" dirty="0">
-                <a:solidFill>
-                  <a:srgbClr val="1F2328"/>
-                </a:solidFill>
-                <a:effectLst/>
-                <a:latin typeface="Aptos" panose="020B0004020202020204" pitchFamily="34" charset="0"/>
-              </a:rPr>
-            </a:br>
-            <a:r>
-              <a:rPr lang="en-US" i="0" dirty="0">
-                <a:solidFill>
-                  <a:srgbClr val="1F2328"/>
-                </a:solidFill>
-                <a:effectLst/>
-                <a:latin typeface="Aptos" panose="020B0004020202020204" pitchFamily="34" charset="0"/>
-              </a:rPr>
-              <a:t>and Summary</a:t>
-            </a:r>
-            <a:endParaRPr lang="he-IL" dirty="0">
-              <a:latin typeface="Aptos" panose="020B0004020202020204" pitchFamily="34" charset="0"/>
-            </a:endParaRPr>
-          </a:p>
-        </p:txBody>
-      </p:sp>
-    </p:spTree>
-    <p:extLst>
-      <p:ext uri="{BB962C8B-B14F-4D97-AF65-F5344CB8AC3E}">
-        <p14:creationId xmlns:p14="http://schemas.microsoft.com/office/powerpoint/2010/main" val="8300517"/>
-      </p:ext>
-    </p:extLst>
-  </p:cSld>
-  <p:clrMapOvr>
-    <a:masterClrMapping/>
-  </p:clrMapOvr>
-</p:sld>
-</file>
-
-<file path=ppt/slides/slide3.xml><?xml version="1.0" encoding="utf-8"?>
-<p:sld xmlns:a="http://schemas.openxmlformats.org/drawingml/2006/main" xmlns:r="http://schemas.openxmlformats.org/officeDocument/2006/relationships" xmlns:p="http://schemas.openxmlformats.org/presentationml/2006/main">
-  <p:cSld>
-    <p:spTree>
-      <p:nvGrpSpPr>
-        <p:cNvPr id="1" name=""/>
-        <p:cNvGrpSpPr/>
-        <p:nvPr/>
-      </p:nvGrpSpPr>
-      <p:grpSpPr>
-        <a:xfrm>
-          <a:off x="0" y="0"/>
-          <a:ext cx="0" cy="0"/>
-          <a:chOff x="0" y="0"/>
-          <a:chExt cx="0" cy="0"/>
-        </a:xfrm>
-      </p:grpSpPr>
-      <p:pic>
-        <p:nvPicPr>
-          <p:cNvPr id="43" name="תמונה 42" descr="תמונה שמכילה שרטוט, ציור, אומנות ילדים, אומנות קווים&#10;&#10;התיאור נוצר באופן אוטומטי">
-            <a:extLst>
-              <a:ext uri="{FF2B5EF4-FFF2-40B4-BE49-F238E27FC236}">
-                <a16:creationId xmlns:a16="http://schemas.microsoft.com/office/drawing/2014/main" id="{599D53EE-A7F5-62A6-C9DA-3B2D211A0142}"/>
-              </a:ext>
-            </a:extLst>
-          </p:cNvPr>
-          <p:cNvPicPr>
-            <a:picLocks noChangeAspect="1"/>
-          </p:cNvPicPr>
-          <p:nvPr/>
-        </p:nvPicPr>
-        <p:blipFill rotWithShape="1">
-          <a:blip r:embed="rId2">
-            <a:extLst>
-              <a:ext uri="{28A0092B-C50C-407E-A947-70E740481C1C}">
-                <a14:useLocalDpi xmlns:a14="http://schemas.microsoft.com/office/drawing/2010/main" val="0"/>
-              </a:ext>
-            </a:extLst>
-          </a:blip>
-          <a:srcRect t="8335" r="53308"/>
-          <a:stretch/>
-        </p:blipFill>
-        <p:spPr>
-          <a:xfrm>
-            <a:off x="8757529" y="1212343"/>
-            <a:ext cx="898969" cy="1366607"/>
-          </a:xfrm>
-          <a:prstGeom prst="rect">
-            <a:avLst/>
-          </a:prstGeom>
-        </p:spPr>
-      </p:pic>
-      <p:pic>
-        <p:nvPicPr>
-          <p:cNvPr id="35" name="תמונה 34" descr="תמונה שמכילה שרטוט, ציור, אומנות ילדים, אומנות קווים&#10;&#10;התיאור נוצר באופן אוטומטי">
-            <a:extLst>
-              <a:ext uri="{FF2B5EF4-FFF2-40B4-BE49-F238E27FC236}">
-                <a16:creationId xmlns:a16="http://schemas.microsoft.com/office/drawing/2014/main" id="{A944BE94-600E-58E3-BFD1-809569B64D6E}"/>
-              </a:ext>
-            </a:extLst>
-          </p:cNvPr>
-          <p:cNvPicPr>
-            <a:picLocks noChangeAspect="1"/>
-          </p:cNvPicPr>
-          <p:nvPr/>
-        </p:nvPicPr>
-        <p:blipFill>
-          <a:blip r:embed="rId3">
-            <a:extLst>
-              <a:ext uri="{28A0092B-C50C-407E-A947-70E740481C1C}">
-                <a14:useLocalDpi xmlns:a14="http://schemas.microsoft.com/office/drawing/2010/main" val="0"/>
-              </a:ext>
-            </a:extLst>
-          </a:blip>
-          <a:stretch>
-            <a:fillRect/>
-          </a:stretch>
-        </p:blipFill>
-        <p:spPr>
-          <a:xfrm>
-            <a:off x="9027234" y="4056476"/>
-            <a:ext cx="941256" cy="1171632"/>
-          </a:xfrm>
-          <a:prstGeom prst="rect">
-            <a:avLst/>
-          </a:prstGeom>
-        </p:spPr>
-      </p:pic>
-      <p:pic>
-        <p:nvPicPr>
-          <p:cNvPr id="36" name="תמונה 35" descr="תמונה שמכילה שרטוט, ציור, אומנות קווים, אומנות ילדים&#10;&#10;התיאור נוצר באופן אוטומטי">
-            <a:extLst>
-              <a:ext uri="{FF2B5EF4-FFF2-40B4-BE49-F238E27FC236}">
-                <a16:creationId xmlns:a16="http://schemas.microsoft.com/office/drawing/2014/main" id="{01EC1526-143A-DF2A-3FE9-4A49D717A9F7}"/>
-              </a:ext>
-            </a:extLst>
-          </p:cNvPr>
-          <p:cNvPicPr>
-            <a:picLocks noChangeAspect="1"/>
-          </p:cNvPicPr>
-          <p:nvPr/>
-        </p:nvPicPr>
-        <p:blipFill>
-          <a:blip r:embed="rId4">
-            <a:extLst>
-              <a:ext uri="{28A0092B-C50C-407E-A947-70E740481C1C}">
-                <a14:useLocalDpi xmlns:a14="http://schemas.microsoft.com/office/drawing/2010/main" val="0"/>
-              </a:ext>
-            </a:extLst>
-          </a:blip>
-          <a:stretch>
-            <a:fillRect/>
-          </a:stretch>
-        </p:blipFill>
-        <p:spPr>
-          <a:xfrm>
-            <a:off x="406040" y="1410608"/>
-            <a:ext cx="1655426" cy="1168342"/>
-          </a:xfrm>
-          <a:prstGeom prst="rect">
-            <a:avLst/>
-          </a:prstGeom>
-        </p:spPr>
-      </p:pic>
-      <p:pic>
-        <p:nvPicPr>
-          <p:cNvPr id="37" name="תמונה 36" descr="תמונה שמכילה ציור, שרטוט, אומנות קווים, אומנות ילדים&#10;&#10;התיאור נוצר באופן אוטומטי">
-            <a:extLst>
-              <a:ext uri="{FF2B5EF4-FFF2-40B4-BE49-F238E27FC236}">
-                <a16:creationId xmlns:a16="http://schemas.microsoft.com/office/drawing/2014/main" id="{A32B99FC-A2D1-80C0-2CB2-86AC76B94D23}"/>
-              </a:ext>
-            </a:extLst>
-          </p:cNvPr>
-          <p:cNvPicPr>
-            <a:picLocks noChangeAspect="1"/>
-          </p:cNvPicPr>
-          <p:nvPr/>
-        </p:nvPicPr>
-        <p:blipFill>
-          <a:blip r:embed="rId5">
-            <a:extLst>
-              <a:ext uri="{28A0092B-C50C-407E-A947-70E740481C1C}">
-                <a14:useLocalDpi xmlns:a14="http://schemas.microsoft.com/office/drawing/2010/main" val="0"/>
-              </a:ext>
-            </a:extLst>
-          </a:blip>
-          <a:stretch>
-            <a:fillRect/>
-          </a:stretch>
-        </p:blipFill>
-        <p:spPr>
-          <a:xfrm>
-            <a:off x="3595006" y="832731"/>
-            <a:ext cx="779992" cy="1787070"/>
-          </a:xfrm>
-          <a:prstGeom prst="rect">
-            <a:avLst/>
-          </a:prstGeom>
-        </p:spPr>
-      </p:pic>
-      <p:pic>
-        <p:nvPicPr>
-          <p:cNvPr id="38" name="תמונה 37" descr="תמונה שמכילה שרטוט, ציור, אומנות קווים, איור&#10;&#10;התיאור נוצר באופן אוטומטי">
-            <a:extLst>
-              <a:ext uri="{FF2B5EF4-FFF2-40B4-BE49-F238E27FC236}">
-                <a16:creationId xmlns:a16="http://schemas.microsoft.com/office/drawing/2014/main" id="{E81B6086-FDC9-6340-25E8-A7CE777587D4}"/>
-              </a:ext>
-            </a:extLst>
-          </p:cNvPr>
-          <p:cNvPicPr>
-            <a:picLocks noChangeAspect="1"/>
-          </p:cNvPicPr>
-          <p:nvPr/>
-        </p:nvPicPr>
-        <p:blipFill>
-          <a:blip r:embed="rId6">
-            <a:extLst>
-              <a:ext uri="{28A0092B-C50C-407E-A947-70E740481C1C}">
-                <a14:useLocalDpi xmlns:a14="http://schemas.microsoft.com/office/drawing/2010/main" val="0"/>
-              </a:ext>
-            </a:extLst>
-          </a:blip>
-          <a:stretch>
-            <a:fillRect/>
-          </a:stretch>
-        </p:blipFill>
-        <p:spPr>
-          <a:xfrm>
-            <a:off x="6074634" y="1423772"/>
-            <a:ext cx="1596186" cy="1155178"/>
-          </a:xfrm>
-          <a:prstGeom prst="rect">
-            <a:avLst/>
-          </a:prstGeom>
-        </p:spPr>
-      </p:pic>
-      <p:pic>
-        <p:nvPicPr>
-          <p:cNvPr id="39" name="תמונה 38" descr="תמונה שמכילה שרטוט, ציור, אומנות ילדים, אומנות קווים&#10;&#10;התיאור נוצר באופן אוטומטי">
-            <a:extLst>
-              <a:ext uri="{FF2B5EF4-FFF2-40B4-BE49-F238E27FC236}">
-                <a16:creationId xmlns:a16="http://schemas.microsoft.com/office/drawing/2014/main" id="{8A749E62-C00D-3308-C13C-36B1DC429CC2}"/>
-              </a:ext>
-            </a:extLst>
-          </p:cNvPr>
-          <p:cNvPicPr>
-            <a:picLocks noChangeAspect="1"/>
-          </p:cNvPicPr>
-          <p:nvPr/>
-        </p:nvPicPr>
-        <p:blipFill rotWithShape="1">
-          <a:blip r:embed="rId2">
-            <a:extLst>
-              <a:ext uri="{28A0092B-C50C-407E-A947-70E740481C1C}">
-                <a14:useLocalDpi xmlns:a14="http://schemas.microsoft.com/office/drawing/2010/main" val="0"/>
-              </a:ext>
-            </a:extLst>
-          </a:blip>
-          <a:srcRect l="47651"/>
-          <a:stretch/>
-        </p:blipFill>
-        <p:spPr>
-          <a:xfrm>
-            <a:off x="9607527" y="1039252"/>
-            <a:ext cx="1007874" cy="1490870"/>
-          </a:xfrm>
-          <a:prstGeom prst="rect">
-            <a:avLst/>
-          </a:prstGeom>
-        </p:spPr>
-      </p:pic>
-      <p:pic>
-        <p:nvPicPr>
-          <p:cNvPr id="40" name="תמונה 39" descr="תמונה שמכילה שרטוט, ציור, אומנות ילדים, אומנות קווים&#10;&#10;התיאור נוצר באופן אוטומטי">
-            <a:extLst>
-              <a:ext uri="{FF2B5EF4-FFF2-40B4-BE49-F238E27FC236}">
-                <a16:creationId xmlns:a16="http://schemas.microsoft.com/office/drawing/2014/main" id="{1A5C1675-1A4F-27AE-549E-18EFA562529C}"/>
-              </a:ext>
-            </a:extLst>
-          </p:cNvPr>
-          <p:cNvPicPr>
-            <a:picLocks noChangeAspect="1"/>
-          </p:cNvPicPr>
-          <p:nvPr/>
-        </p:nvPicPr>
-        <p:blipFill>
-          <a:blip r:embed="rId7">
-            <a:extLst>
-              <a:ext uri="{28A0092B-C50C-407E-A947-70E740481C1C}">
-                <a14:useLocalDpi xmlns:a14="http://schemas.microsoft.com/office/drawing/2010/main" val="0"/>
-              </a:ext>
-            </a:extLst>
-          </a:blip>
-          <a:stretch>
-            <a:fillRect/>
-          </a:stretch>
-        </p:blipFill>
-        <p:spPr>
-          <a:xfrm>
-            <a:off x="805514" y="3903367"/>
-            <a:ext cx="1079482" cy="1280240"/>
-          </a:xfrm>
-          <a:prstGeom prst="rect">
-            <a:avLst/>
-          </a:prstGeom>
-        </p:spPr>
-      </p:pic>
-      <p:pic>
-        <p:nvPicPr>
-          <p:cNvPr id="42" name="תמונה 41" descr="תמונה שמכילה שרטוט, ציור, אומנות ילדים, אומנות קווים&#10;&#10;התיאור נוצר באופן אוטומטי">
-            <a:extLst>
-              <a:ext uri="{FF2B5EF4-FFF2-40B4-BE49-F238E27FC236}">
-                <a16:creationId xmlns:a16="http://schemas.microsoft.com/office/drawing/2014/main" id="{67D72FEA-28DE-7373-AB2C-A7FA12FEBDFC}"/>
-              </a:ext>
-            </a:extLst>
-          </p:cNvPr>
-          <p:cNvPicPr>
-            <a:picLocks noChangeAspect="1"/>
-          </p:cNvPicPr>
-          <p:nvPr/>
-        </p:nvPicPr>
-        <p:blipFill>
-          <a:blip r:embed="rId8">
-            <a:extLst>
-              <a:ext uri="{28A0092B-C50C-407E-A947-70E740481C1C}">
-                <a14:useLocalDpi xmlns:a14="http://schemas.microsoft.com/office/drawing/2010/main" val="0"/>
-              </a:ext>
-            </a:extLst>
-          </a:blip>
-          <a:stretch>
-            <a:fillRect/>
-          </a:stretch>
-        </p:blipFill>
-        <p:spPr>
-          <a:xfrm>
-            <a:off x="6074634" y="3794761"/>
-            <a:ext cx="1326314" cy="1497452"/>
-          </a:xfrm>
-          <a:prstGeom prst="rect">
-            <a:avLst/>
-          </a:prstGeom>
-        </p:spPr>
-      </p:pic>
-      <p:sp>
-        <p:nvSpPr>
-          <p:cNvPr id="5" name="תיבת טקסט 4">
-            <a:extLst>
-              <a:ext uri="{FF2B5EF4-FFF2-40B4-BE49-F238E27FC236}">
-                <a16:creationId xmlns:a16="http://schemas.microsoft.com/office/drawing/2014/main" id="{C0BF8F2E-F962-48D5-052F-F0A26625A5D7}"/>
-              </a:ext>
-            </a:extLst>
-          </p:cNvPr>
-          <p:cNvSpPr txBox="1"/>
-          <p:nvPr/>
-        </p:nvSpPr>
-        <p:spPr>
-          <a:xfrm>
-            <a:off x="-1" y="2516778"/>
-            <a:ext cx="2690513" cy="369332"/>
-          </a:xfrm>
-          <a:prstGeom prst="rect">
-            <a:avLst/>
-          </a:prstGeom>
-          <a:noFill/>
-        </p:spPr>
-        <p:txBody>
-          <a:bodyPr wrap="square">
-            <a:spAutoFit/>
-          </a:bodyPr>
-          <a:lstStyle/>
-          <a:p>
-            <a:pPr algn="ctr" rtl="0"/>
-            <a:r>
-              <a:rPr lang="de-DE" i="0" dirty="0">
-                <a:solidFill>
-                  <a:srgbClr val="1F2328"/>
-                </a:solidFill>
-                <a:effectLst/>
-                <a:latin typeface="Aptos" panose="020B0004020202020204" pitchFamily="34" charset="0"/>
-              </a:rPr>
-              <a:t>Model Training</a:t>
-            </a:r>
-            <a:endParaRPr lang="he-IL" dirty="0">
-              <a:latin typeface="Aptos" panose="020B0004020202020204" pitchFamily="34" charset="0"/>
-            </a:endParaRPr>
-          </a:p>
-        </p:txBody>
-      </p:sp>
-      <p:sp>
-        <p:nvSpPr>
-          <p:cNvPr id="7" name="תיבת טקסט 6">
-            <a:extLst>
-              <a:ext uri="{FF2B5EF4-FFF2-40B4-BE49-F238E27FC236}">
-                <a16:creationId xmlns:a16="http://schemas.microsoft.com/office/drawing/2014/main" id="{FB1E60C8-3014-32CE-5860-60D14110E76A}"/>
-              </a:ext>
-            </a:extLst>
-          </p:cNvPr>
-          <p:cNvSpPr txBox="1"/>
-          <p:nvPr/>
-        </p:nvSpPr>
-        <p:spPr>
-          <a:xfrm>
-            <a:off x="2774073" y="2516778"/>
-            <a:ext cx="2690513" cy="1200329"/>
-          </a:xfrm>
-          <a:prstGeom prst="rect">
-            <a:avLst/>
-          </a:prstGeom>
-          <a:noFill/>
-        </p:spPr>
-        <p:txBody>
-          <a:bodyPr wrap="square">
-            <a:spAutoFit/>
-          </a:bodyPr>
-          <a:lstStyle/>
-          <a:p>
-            <a:pPr algn="ctr" rtl="0"/>
-            <a:r>
-              <a:rPr lang="en-US" i="0" dirty="0">
-                <a:solidFill>
-                  <a:srgbClr val="1F2328"/>
-                </a:solidFill>
-                <a:effectLst/>
-                <a:latin typeface="Aptos" panose="020B0004020202020204" pitchFamily="34" charset="0"/>
-              </a:rPr>
-              <a:t>Building the </a:t>
-            </a:r>
-            <a:br>
-              <a:rPr lang="en-US" i="0" dirty="0">
-                <a:solidFill>
-                  <a:srgbClr val="1F2328"/>
-                </a:solidFill>
-                <a:effectLst/>
-                <a:latin typeface="Aptos" panose="020B0004020202020204" pitchFamily="34" charset="0"/>
-              </a:rPr>
-            </a:br>
-            <a:r>
-              <a:rPr lang="en-US" i="0" dirty="0">
-                <a:solidFill>
-                  <a:srgbClr val="1F2328"/>
-                </a:solidFill>
-                <a:effectLst/>
-                <a:latin typeface="Aptos" panose="020B0004020202020204" pitchFamily="34" charset="0"/>
-              </a:rPr>
-              <a:t>End-to-End Application Architecture for Using the Model</a:t>
-            </a:r>
-            <a:endParaRPr lang="he-IL" dirty="0">
-              <a:latin typeface="Aptos" panose="020B0004020202020204" pitchFamily="34" charset="0"/>
-            </a:endParaRPr>
-          </a:p>
-        </p:txBody>
-      </p:sp>
-      <p:sp>
-        <p:nvSpPr>
-          <p:cNvPr id="9" name="תיבת טקסט 8">
-            <a:extLst>
-              <a:ext uri="{FF2B5EF4-FFF2-40B4-BE49-F238E27FC236}">
-                <a16:creationId xmlns:a16="http://schemas.microsoft.com/office/drawing/2014/main" id="{453DF033-F0C2-2E31-EBEC-0F2DE7B0E200}"/>
-              </a:ext>
-            </a:extLst>
-          </p:cNvPr>
-          <p:cNvSpPr txBox="1"/>
-          <p:nvPr/>
-        </p:nvSpPr>
-        <p:spPr>
-          <a:xfrm>
-            <a:off x="5548147" y="2516778"/>
-            <a:ext cx="2690513" cy="923330"/>
-          </a:xfrm>
-          <a:prstGeom prst="rect">
-            <a:avLst/>
-          </a:prstGeom>
-          <a:noFill/>
-        </p:spPr>
-        <p:txBody>
-          <a:bodyPr wrap="square">
-            <a:spAutoFit/>
-          </a:bodyPr>
-          <a:lstStyle/>
-          <a:p>
-            <a:pPr algn="ctr" rtl="0"/>
-            <a:r>
-              <a:rPr lang="de-DE" i="0" dirty="0">
-                <a:solidFill>
-                  <a:srgbClr val="1F2328"/>
-                </a:solidFill>
-                <a:effectLst/>
-                <a:latin typeface="Aptos" panose="020B0004020202020204" pitchFamily="34" charset="0"/>
-              </a:rPr>
-              <a:t>Implementing Continuous Integration Practices</a:t>
-            </a:r>
-            <a:endParaRPr lang="he-IL" dirty="0">
-              <a:latin typeface="Aptos" panose="020B0004020202020204" pitchFamily="34" charset="0"/>
-            </a:endParaRPr>
-          </a:p>
-        </p:txBody>
-      </p:sp>
-      <p:sp>
-        <p:nvSpPr>
-          <p:cNvPr id="11" name="תיבת טקסט 10">
-            <a:extLst>
-              <a:ext uri="{FF2B5EF4-FFF2-40B4-BE49-F238E27FC236}">
-                <a16:creationId xmlns:a16="http://schemas.microsoft.com/office/drawing/2014/main" id="{EFA7D353-DCDB-90D5-C325-621252A5055E}"/>
-              </a:ext>
-            </a:extLst>
-          </p:cNvPr>
-          <p:cNvSpPr txBox="1"/>
-          <p:nvPr/>
-        </p:nvSpPr>
-        <p:spPr>
-          <a:xfrm>
-            <a:off x="8322222" y="2516778"/>
-            <a:ext cx="2690513" cy="646331"/>
-          </a:xfrm>
-          <a:prstGeom prst="rect">
-            <a:avLst/>
-          </a:prstGeom>
-          <a:noFill/>
-        </p:spPr>
-        <p:txBody>
-          <a:bodyPr wrap="square">
-            <a:spAutoFit/>
-          </a:bodyPr>
-          <a:lstStyle/>
-          <a:p>
-            <a:pPr algn="ctr" rtl="0"/>
-            <a:r>
-              <a:rPr lang="en-US" i="0" dirty="0">
-                <a:solidFill>
-                  <a:srgbClr val="1F2328"/>
-                </a:solidFill>
-                <a:effectLst/>
-                <a:latin typeface="Aptos" panose="020B0004020202020204" pitchFamily="34" charset="0"/>
-              </a:rPr>
-              <a:t>Exposing an API Using Swagger</a:t>
-            </a:r>
-            <a:endParaRPr lang="he-IL" dirty="0">
-              <a:latin typeface="Aptos" panose="020B0004020202020204" pitchFamily="34" charset="0"/>
-            </a:endParaRPr>
-          </a:p>
-        </p:txBody>
-      </p:sp>
-      <p:sp>
-        <p:nvSpPr>
-          <p:cNvPr id="13" name="תיבת טקסט 12">
-            <a:extLst>
-              <a:ext uri="{FF2B5EF4-FFF2-40B4-BE49-F238E27FC236}">
-                <a16:creationId xmlns:a16="http://schemas.microsoft.com/office/drawing/2014/main" id="{EFC6A3E4-3E6D-4314-41A5-C81316224D68}"/>
-              </a:ext>
-            </a:extLst>
-          </p:cNvPr>
-          <p:cNvSpPr txBox="1"/>
-          <p:nvPr/>
-        </p:nvSpPr>
-        <p:spPr>
-          <a:xfrm>
-            <a:off x="-1" y="5141804"/>
-            <a:ext cx="2690513" cy="646331"/>
-          </a:xfrm>
-          <a:prstGeom prst="rect">
-            <a:avLst/>
-          </a:prstGeom>
-          <a:noFill/>
-        </p:spPr>
-        <p:txBody>
-          <a:bodyPr wrap="square">
-            <a:spAutoFit/>
-          </a:bodyPr>
-          <a:lstStyle/>
-          <a:p>
-            <a:pPr algn="ctr" rtl="0"/>
-            <a:r>
-              <a:rPr lang="de-DE" i="0" dirty="0">
-                <a:solidFill>
-                  <a:srgbClr val="1F2328"/>
-                </a:solidFill>
-                <a:effectLst/>
-                <a:latin typeface="Aptos" panose="020B0004020202020204" pitchFamily="34" charset="0"/>
-              </a:rPr>
-              <a:t>Build &amp; </a:t>
-            </a:r>
-          </a:p>
-          <a:p>
-            <a:pPr algn="ctr" rtl="0"/>
-            <a:r>
-              <a:rPr lang="de-DE" i="0" dirty="0">
-                <a:solidFill>
-                  <a:srgbClr val="1F2328"/>
-                </a:solidFill>
-                <a:effectLst/>
-                <a:latin typeface="Aptos" panose="020B0004020202020204" pitchFamily="34" charset="0"/>
-              </a:rPr>
-              <a:t>Deployment</a:t>
-            </a:r>
-            <a:endParaRPr lang="he-IL" dirty="0">
-              <a:latin typeface="Aptos" panose="020B0004020202020204" pitchFamily="34" charset="0"/>
-            </a:endParaRPr>
-          </a:p>
-        </p:txBody>
-      </p:sp>
-      <p:sp>
-        <p:nvSpPr>
-          <p:cNvPr id="15" name="תיבת טקסט 14">
-            <a:extLst>
-              <a:ext uri="{FF2B5EF4-FFF2-40B4-BE49-F238E27FC236}">
-                <a16:creationId xmlns:a16="http://schemas.microsoft.com/office/drawing/2014/main" id="{61C88B26-1490-5E97-AA81-9CC62F1E2ADF}"/>
-              </a:ext>
-            </a:extLst>
-          </p:cNvPr>
-          <p:cNvSpPr txBox="1"/>
-          <p:nvPr/>
-        </p:nvSpPr>
-        <p:spPr>
-          <a:xfrm>
-            <a:off x="2694138" y="5141804"/>
-            <a:ext cx="2690513" cy="646331"/>
-          </a:xfrm>
-          <a:prstGeom prst="rect">
-            <a:avLst/>
-          </a:prstGeom>
-          <a:noFill/>
-        </p:spPr>
-        <p:txBody>
-          <a:bodyPr wrap="square">
-            <a:spAutoFit/>
-          </a:bodyPr>
-          <a:lstStyle/>
-          <a:p>
-            <a:pPr algn="ctr" rtl="0"/>
-            <a:r>
-              <a:rPr lang="en-US" i="0" dirty="0">
-                <a:solidFill>
-                  <a:srgbClr val="1F2328"/>
-                </a:solidFill>
-                <a:effectLst/>
-                <a:latin typeface="Aptos" panose="020B0004020202020204" pitchFamily="34" charset="0"/>
-              </a:rPr>
-              <a:t>Cloud Integration (Exploring Google Cloud)</a:t>
-            </a:r>
-            <a:endParaRPr lang="he-IL" dirty="0">
-              <a:latin typeface="Aptos" panose="020B0004020202020204" pitchFamily="34" charset="0"/>
-            </a:endParaRPr>
-          </a:p>
-        </p:txBody>
-      </p:sp>
-      <p:sp>
-        <p:nvSpPr>
-          <p:cNvPr id="17" name="תיבת טקסט 16">
-            <a:extLst>
-              <a:ext uri="{FF2B5EF4-FFF2-40B4-BE49-F238E27FC236}">
-                <a16:creationId xmlns:a16="http://schemas.microsoft.com/office/drawing/2014/main" id="{6A774A82-22C4-1745-360B-EDD2C3632BF5}"/>
-              </a:ext>
-            </a:extLst>
-          </p:cNvPr>
-          <p:cNvSpPr txBox="1"/>
-          <p:nvPr/>
-        </p:nvSpPr>
-        <p:spPr>
-          <a:xfrm>
-            <a:off x="5388277" y="5141804"/>
-            <a:ext cx="2810416" cy="923330"/>
-          </a:xfrm>
-          <a:prstGeom prst="rect">
-            <a:avLst/>
-          </a:prstGeom>
-          <a:noFill/>
-        </p:spPr>
-        <p:txBody>
-          <a:bodyPr wrap="square">
-            <a:spAutoFit/>
-          </a:bodyPr>
-          <a:lstStyle/>
-          <a:p>
-            <a:pPr algn="ctr" rtl="0"/>
-            <a:r>
-              <a:rPr lang="en-US" i="0" dirty="0">
-                <a:solidFill>
-                  <a:srgbClr val="1F2328"/>
-                </a:solidFill>
-                <a:effectLst/>
-                <a:latin typeface="Aptos" panose="020B0004020202020204" pitchFamily="34" charset="0"/>
-              </a:rPr>
-              <a:t>Automated Cloud Deployment Using Terraform</a:t>
-            </a:r>
-            <a:endParaRPr lang="he-IL" dirty="0">
-              <a:latin typeface="Aptos" panose="020B0004020202020204" pitchFamily="34" charset="0"/>
-            </a:endParaRPr>
-          </a:p>
-        </p:txBody>
-      </p:sp>
-      <p:sp>
-        <p:nvSpPr>
-          <p:cNvPr id="18" name="תיבת טקסט 17">
-            <a:extLst>
-              <a:ext uri="{FF2B5EF4-FFF2-40B4-BE49-F238E27FC236}">
-                <a16:creationId xmlns:a16="http://schemas.microsoft.com/office/drawing/2014/main" id="{B927CD92-DE29-42F1-1B36-0FDA3CDCB64C}"/>
-              </a:ext>
-            </a:extLst>
-          </p:cNvPr>
-          <p:cNvSpPr txBox="1"/>
-          <p:nvPr/>
-        </p:nvSpPr>
-        <p:spPr>
-          <a:xfrm>
-            <a:off x="8202319" y="5141804"/>
-            <a:ext cx="2810416" cy="646331"/>
-          </a:xfrm>
-          <a:prstGeom prst="rect">
-            <a:avLst/>
-          </a:prstGeom>
-          <a:noFill/>
-        </p:spPr>
-        <p:txBody>
-          <a:bodyPr wrap="square">
-            <a:spAutoFit/>
-          </a:bodyPr>
-          <a:lstStyle/>
-          <a:p>
-            <a:pPr algn="ctr" rtl="0"/>
-            <a:r>
-              <a:rPr lang="en-US" i="0" dirty="0">
-                <a:solidFill>
-                  <a:srgbClr val="1F2328"/>
-                </a:solidFill>
-                <a:effectLst/>
-                <a:latin typeface="Aptos" panose="020B0004020202020204" pitchFamily="34" charset="0"/>
-              </a:rPr>
-              <a:t>Documentation</a:t>
-            </a:r>
-            <a:br>
-              <a:rPr lang="en-US" i="0" dirty="0">
-                <a:solidFill>
-                  <a:srgbClr val="1F2328"/>
-                </a:solidFill>
-                <a:effectLst/>
-                <a:latin typeface="Aptos" panose="020B0004020202020204" pitchFamily="34" charset="0"/>
-              </a:rPr>
-            </a:br>
-            <a:r>
-              <a:rPr lang="en-US" i="0" dirty="0">
-                <a:solidFill>
-                  <a:srgbClr val="1F2328"/>
-                </a:solidFill>
-                <a:effectLst/>
-                <a:latin typeface="Aptos" panose="020B0004020202020204" pitchFamily="34" charset="0"/>
-              </a:rPr>
-              <a:t>and Summary</a:t>
-            </a:r>
-            <a:endParaRPr lang="he-IL" dirty="0">
-              <a:latin typeface="Aptos" panose="020B0004020202020204" pitchFamily="34" charset="0"/>
-            </a:endParaRPr>
-          </a:p>
-        </p:txBody>
-      </p:sp>
-      <p:grpSp>
-        <p:nvGrpSpPr>
-          <p:cNvPr id="2" name="קבוצה 1">
-            <a:extLst>
-              <a:ext uri="{FF2B5EF4-FFF2-40B4-BE49-F238E27FC236}">
-                <a16:creationId xmlns:a16="http://schemas.microsoft.com/office/drawing/2014/main" id="{D6F3C60F-03F0-12E0-6E4A-5488389E73A3}"/>
-              </a:ext>
-            </a:extLst>
-          </p:cNvPr>
-          <p:cNvGrpSpPr/>
-          <p:nvPr/>
-        </p:nvGrpSpPr>
-        <p:grpSpPr>
-          <a:xfrm>
-            <a:off x="2887883" y="4038705"/>
-            <a:ext cx="1687251" cy="1143530"/>
-            <a:chOff x="6276550" y="4451128"/>
-            <a:chExt cx="1687251" cy="1143530"/>
-          </a:xfrm>
-        </p:grpSpPr>
-        <p:pic>
-          <p:nvPicPr>
-            <p:cNvPr id="3" name="תמונה 2" descr="תמונה שמכילה ציור, שרטוט, אומנות ילדים, אומנות קווים&#10;&#10;התיאור נוצר באופן אוטומטי">
-              <a:extLst>
-                <a:ext uri="{FF2B5EF4-FFF2-40B4-BE49-F238E27FC236}">
-                  <a16:creationId xmlns:a16="http://schemas.microsoft.com/office/drawing/2014/main" id="{9CE0370D-8D0C-906A-147C-4FB3D8045A74}"/>
-                </a:ext>
-              </a:extLst>
-            </p:cNvPr>
-            <p:cNvPicPr>
-              <a:picLocks noChangeAspect="1"/>
-            </p:cNvPicPr>
-            <p:nvPr/>
-          </p:nvPicPr>
-          <p:blipFill rotWithShape="1">
-            <a:blip r:embed="rId9">
-              <a:extLst>
-                <a:ext uri="{28A0092B-C50C-407E-A947-70E740481C1C}">
-                  <a14:useLocalDpi xmlns:a14="http://schemas.microsoft.com/office/drawing/2010/main" val="0"/>
-                </a:ext>
-              </a:extLst>
-            </a:blip>
-            <a:srcRect r="46664" b="58426"/>
-            <a:stretch/>
-          </p:blipFill>
-          <p:spPr>
-            <a:xfrm>
-              <a:off x="6276550" y="4451128"/>
-              <a:ext cx="916294" cy="506243"/>
-            </a:xfrm>
-            <a:prstGeom prst="rect">
-              <a:avLst/>
-            </a:prstGeom>
-          </p:spPr>
-        </p:pic>
-        <p:pic>
-          <p:nvPicPr>
-            <p:cNvPr id="4" name="תמונה 3" descr="תמונה שמכילה ציור, שרטוט, אומנות ילדים, אומנות קווים&#10;&#10;התיאור נוצר באופן אוטומטי">
-              <a:extLst>
-                <a:ext uri="{FF2B5EF4-FFF2-40B4-BE49-F238E27FC236}">
-                  <a16:creationId xmlns:a16="http://schemas.microsoft.com/office/drawing/2014/main" id="{6B2CE77F-615F-6208-C141-1212158F3A64}"/>
-                </a:ext>
-              </a:extLst>
-            </p:cNvPr>
-            <p:cNvPicPr>
-              <a:picLocks noChangeAspect="1"/>
-            </p:cNvPicPr>
-            <p:nvPr/>
-          </p:nvPicPr>
-          <p:blipFill rotWithShape="1">
-            <a:blip r:embed="rId9">
-              <a:extLst>
-                <a:ext uri="{28A0092B-C50C-407E-A947-70E740481C1C}">
-                  <a14:useLocalDpi xmlns:a14="http://schemas.microsoft.com/office/drawing/2010/main" val="0"/>
-                </a:ext>
-              </a:extLst>
-            </a:blip>
-            <a:srcRect l="47950" t="42261" b="-1"/>
-            <a:stretch/>
-          </p:blipFill>
-          <p:spPr>
-            <a:xfrm>
-              <a:off x="7069611" y="4891550"/>
-              <a:ext cx="894190" cy="703108"/>
-            </a:xfrm>
-            <a:prstGeom prst="rect">
-              <a:avLst/>
-            </a:prstGeom>
-          </p:spPr>
-        </p:pic>
-      </p:grpSp>
-    </p:spTree>
-    <p:extLst>
-      <p:ext uri="{BB962C8B-B14F-4D97-AF65-F5344CB8AC3E}">
-        <p14:creationId xmlns:p14="http://schemas.microsoft.com/office/powerpoint/2010/main" val="2534682284"/>
-      </p:ext>
-    </p:extLst>
-  </p:cSld>
-  <p:clrMapOvr>
-    <a:masterClrMapping/>
-  </p:clrMapOvr>
-</p:sld>
-</file>
-
-<file path=ppt/slides/slide4.xml><?xml version="1.0" encoding="utf-8"?>
-<p:sld xmlns:a="http://schemas.openxmlformats.org/drawingml/2006/main" xmlns:r="http://schemas.openxmlformats.org/officeDocument/2006/relationships" xmlns:p="http://schemas.openxmlformats.org/presentationml/2006/main">
-  <p:cSld>
-    <p:spTree>
-      <p:nvGrpSpPr>
-        <p:cNvPr id="1" name=""/>
-        <p:cNvGrpSpPr/>
-        <p:nvPr/>
-      </p:nvGrpSpPr>
-      <p:grpSpPr>
-        <a:xfrm>
-          <a:off x="0" y="0"/>
-          <a:ext cx="0" cy="0"/>
-          <a:chOff x="0" y="0"/>
-          <a:chExt cx="0" cy="0"/>
-        </a:xfrm>
-      </p:grpSpPr>
       <p:pic>
         <p:nvPicPr>
           <p:cNvPr id="43" name="תמונה 42" descr="תמונה שמכילה שרטוט, ציור, אומנות ילדים, אומנות קווים&#10;&#10;התיאור נוצר באופן אוטומטי">
@@ -6489,7 +4130,7 @@
 </p:sld>
 </file>
 
-<file path=ppt/slides/slide5.xml><?xml version="1.0" encoding="utf-8"?>
+<file path=ppt/slides/slide2.xml><?xml version="1.0" encoding="utf-8"?>
 <p:sld xmlns:a="http://schemas.openxmlformats.org/drawingml/2006/main" xmlns:r="http://schemas.openxmlformats.org/officeDocument/2006/relationships" xmlns:p="http://schemas.openxmlformats.org/presentationml/2006/main">
   <p:cSld>
     <p:spTree>
@@ -6555,7 +4196,7 @@
 </p:sld>
 </file>
 
-<file path=ppt/slides/slide6.xml><?xml version="1.0" encoding="utf-8"?>
+<file path=ppt/slides/slide3.xml><?xml version="1.0" encoding="utf-8"?>
 <p:sld xmlns:a="http://schemas.openxmlformats.org/drawingml/2006/main" xmlns:r="http://schemas.openxmlformats.org/officeDocument/2006/relationships" xmlns:p="http://schemas.openxmlformats.org/presentationml/2006/main">
   <p:cSld>
     <p:spTree>
@@ -7817,6 +5458,1256 @@
     <p:extLst>
       <p:ext uri="{BB962C8B-B14F-4D97-AF65-F5344CB8AC3E}">
         <p14:creationId xmlns:p14="http://schemas.microsoft.com/office/powerpoint/2010/main" val="3738161511"/>
+      </p:ext>
+    </p:extLst>
+  </p:cSld>
+  <p:clrMapOvr>
+    <a:masterClrMapping/>
+  </p:clrMapOvr>
+</p:sld>
+</file>
+
+<file path=ppt/slides/slide4.xml><?xml version="1.0" encoding="utf-8"?>
+<p:sld xmlns:a="http://schemas.openxmlformats.org/drawingml/2006/main" xmlns:r="http://schemas.openxmlformats.org/officeDocument/2006/relationships" xmlns:p="http://schemas.openxmlformats.org/presentationml/2006/main">
+  <p:cSld>
+    <p:spTree>
+      <p:nvGrpSpPr>
+        <p:cNvPr id="1" name=""/>
+        <p:cNvGrpSpPr/>
+        <p:nvPr/>
+      </p:nvGrpSpPr>
+      <p:grpSpPr>
+        <a:xfrm>
+          <a:off x="0" y="0"/>
+          <a:ext cx="0" cy="0"/>
+          <a:chOff x="0" y="0"/>
+          <a:chExt cx="0" cy="0"/>
+        </a:xfrm>
+      </p:grpSpPr>
+      <p:pic>
+        <p:nvPicPr>
+          <p:cNvPr id="1026" name="Picture 2" descr="Python logo and symbol, meaning, history, PNG">
+            <a:extLst>
+              <a:ext uri="{FF2B5EF4-FFF2-40B4-BE49-F238E27FC236}">
+                <a16:creationId xmlns:a16="http://schemas.microsoft.com/office/drawing/2014/main" id="{CE653517-8281-F9BC-EFAA-625D7A781ABA}"/>
+              </a:ext>
+            </a:extLst>
+          </p:cNvPr>
+          <p:cNvPicPr>
+            <a:picLocks noChangeAspect="1" noChangeArrowheads="1"/>
+          </p:cNvPicPr>
+          <p:nvPr/>
+        </p:nvPicPr>
+        <p:blipFill rotWithShape="1">
+          <a:blip r:embed="rId2">
+            <a:extLst>
+              <a:ext uri="{28A0092B-C50C-407E-A947-70E740481C1C}">
+                <a14:useLocalDpi xmlns:a14="http://schemas.microsoft.com/office/drawing/2010/main" val="0"/>
+              </a:ext>
+            </a:extLst>
+          </a:blip>
+          <a:srcRect t="21009" r="5653" b="21009"/>
+          <a:stretch/>
+        </p:blipFill>
+        <p:spPr bwMode="auto">
+          <a:xfrm>
+            <a:off x="661263" y="663499"/>
+            <a:ext cx="1223368" cy="469900"/>
+          </a:xfrm>
+          <a:prstGeom prst="rect">
+            <a:avLst/>
+          </a:prstGeom>
+          <a:noFill/>
+          <a:extLst>
+            <a:ext uri="{909E8E84-426E-40DD-AFC4-6F175D3DCCD1}">
+              <a14:hiddenFill xmlns:a14="http://schemas.microsoft.com/office/drawing/2010/main">
+                <a:solidFill>
+                  <a:srgbClr val="FFFFFF"/>
+                </a:solidFill>
+              </a14:hiddenFill>
+            </a:ext>
+          </a:extLst>
+        </p:spPr>
+      </p:pic>
+      <p:pic>
+        <p:nvPicPr>
+          <p:cNvPr id="1028" name="Picture 4">
+            <a:extLst>
+              <a:ext uri="{FF2B5EF4-FFF2-40B4-BE49-F238E27FC236}">
+                <a16:creationId xmlns:a16="http://schemas.microsoft.com/office/drawing/2014/main" id="{6CFC454D-ACF0-ADDF-11CE-3B6B18078152}"/>
+              </a:ext>
+            </a:extLst>
+          </p:cNvPr>
+          <p:cNvPicPr>
+            <a:picLocks noChangeAspect="1" noChangeArrowheads="1"/>
+          </p:cNvPicPr>
+          <p:nvPr/>
+        </p:nvPicPr>
+        <p:blipFill>
+          <a:blip r:embed="rId3">
+            <a:extLst>
+              <a:ext uri="{28A0092B-C50C-407E-A947-70E740481C1C}">
+                <a14:useLocalDpi xmlns:a14="http://schemas.microsoft.com/office/drawing/2010/main" val="0"/>
+              </a:ext>
+            </a:extLst>
+          </a:blip>
+          <a:srcRect/>
+          <a:stretch>
+            <a:fillRect/>
+          </a:stretch>
+        </p:blipFill>
+        <p:spPr bwMode="auto">
+          <a:xfrm>
+            <a:off x="2069671" y="763469"/>
+            <a:ext cx="1088343" cy="269960"/>
+          </a:xfrm>
+          <a:prstGeom prst="rect">
+            <a:avLst/>
+          </a:prstGeom>
+          <a:noFill/>
+          <a:extLst>
+            <a:ext uri="{909E8E84-426E-40DD-AFC4-6F175D3DCCD1}">
+              <a14:hiddenFill xmlns:a14="http://schemas.microsoft.com/office/drawing/2010/main">
+                <a:solidFill>
+                  <a:srgbClr val="FFFFFF"/>
+                </a:solidFill>
+              </a14:hiddenFill>
+            </a:ext>
+          </a:extLst>
+        </p:spPr>
+      </p:pic>
+      <p:pic>
+        <p:nvPicPr>
+          <p:cNvPr id="6" name="תמונה 5">
+            <a:extLst>
+              <a:ext uri="{FF2B5EF4-FFF2-40B4-BE49-F238E27FC236}">
+                <a16:creationId xmlns:a16="http://schemas.microsoft.com/office/drawing/2014/main" id="{D2128DA6-3E51-663A-C4BA-7DF018791481}"/>
+              </a:ext>
+            </a:extLst>
+          </p:cNvPr>
+          <p:cNvPicPr>
+            <a:picLocks noChangeAspect="1"/>
+          </p:cNvPicPr>
+          <p:nvPr/>
+        </p:nvPicPr>
+        <p:blipFill>
+          <a:blip r:embed="rId4"/>
+          <a:stretch>
+            <a:fillRect/>
+          </a:stretch>
+        </p:blipFill>
+        <p:spPr>
+          <a:xfrm>
+            <a:off x="3343054" y="719990"/>
+            <a:ext cx="1223368" cy="356918"/>
+          </a:xfrm>
+          <a:prstGeom prst="rect">
+            <a:avLst/>
+          </a:prstGeom>
+        </p:spPr>
+      </p:pic>
+      <p:pic>
+        <p:nvPicPr>
+          <p:cNvPr id="1032" name="Picture 8">
+            <a:extLst>
+              <a:ext uri="{FF2B5EF4-FFF2-40B4-BE49-F238E27FC236}">
+                <a16:creationId xmlns:a16="http://schemas.microsoft.com/office/drawing/2014/main" id="{F10FFF9F-9798-F18E-1BD3-8BE93F84E2D1}"/>
+              </a:ext>
+            </a:extLst>
+          </p:cNvPr>
+          <p:cNvPicPr>
+            <a:picLocks noChangeAspect="1" noChangeArrowheads="1"/>
+          </p:cNvPicPr>
+          <p:nvPr/>
+        </p:nvPicPr>
+        <p:blipFill rotWithShape="1">
+          <a:blip r:embed="rId5">
+            <a:extLst>
+              <a:ext uri="{28A0092B-C50C-407E-A947-70E740481C1C}">
+                <a14:useLocalDpi xmlns:a14="http://schemas.microsoft.com/office/drawing/2010/main" val="0"/>
+              </a:ext>
+            </a:extLst>
+          </a:blip>
+          <a:srcRect r="2904"/>
+          <a:stretch/>
+        </p:blipFill>
+        <p:spPr bwMode="auto">
+          <a:xfrm>
+            <a:off x="4751462" y="722692"/>
+            <a:ext cx="1268135" cy="351515"/>
+          </a:xfrm>
+          <a:prstGeom prst="rect">
+            <a:avLst/>
+          </a:prstGeom>
+          <a:noFill/>
+          <a:extLst>
+            <a:ext uri="{909E8E84-426E-40DD-AFC4-6F175D3DCCD1}">
+              <a14:hiddenFill xmlns:a14="http://schemas.microsoft.com/office/drawing/2010/main">
+                <a:solidFill>
+                  <a:srgbClr val="FFFFFF"/>
+                </a:solidFill>
+              </a14:hiddenFill>
+            </a:ext>
+          </a:extLst>
+        </p:spPr>
+      </p:pic>
+      <p:pic>
+        <p:nvPicPr>
+          <p:cNvPr id="1034" name="Picture 10" descr="Introducing Rapid-Xpress: A Lightning-Fast Scaffolding Tool for Express.js  Applications | by Bassit Owolabi | Level Up Coding">
+            <a:extLst>
+              <a:ext uri="{FF2B5EF4-FFF2-40B4-BE49-F238E27FC236}">
+                <a16:creationId xmlns:a16="http://schemas.microsoft.com/office/drawing/2014/main" id="{2D038A5D-521A-6A9E-719A-365D2C514D9F}"/>
+              </a:ext>
+            </a:extLst>
+          </p:cNvPr>
+          <p:cNvPicPr>
+            <a:picLocks noChangeAspect="1" noChangeArrowheads="1"/>
+          </p:cNvPicPr>
+          <p:nvPr/>
+        </p:nvPicPr>
+        <p:blipFill>
+          <a:blip r:embed="rId6">
+            <a:extLst>
+              <a:ext uri="{28A0092B-C50C-407E-A947-70E740481C1C}">
+                <a14:useLocalDpi xmlns:a14="http://schemas.microsoft.com/office/drawing/2010/main" val="0"/>
+              </a:ext>
+            </a:extLst>
+          </a:blip>
+          <a:srcRect/>
+          <a:stretch>
+            <a:fillRect/>
+          </a:stretch>
+        </p:blipFill>
+        <p:spPr bwMode="auto">
+          <a:xfrm>
+            <a:off x="6204637" y="707408"/>
+            <a:ext cx="1180979" cy="382082"/>
+          </a:xfrm>
+          <a:prstGeom prst="rect">
+            <a:avLst/>
+          </a:prstGeom>
+          <a:noFill/>
+          <a:extLst>
+            <a:ext uri="{909E8E84-426E-40DD-AFC4-6F175D3DCCD1}">
+              <a14:hiddenFill xmlns:a14="http://schemas.microsoft.com/office/drawing/2010/main">
+                <a:solidFill>
+                  <a:srgbClr val="FFFFFF"/>
+                </a:solidFill>
+              </a14:hiddenFill>
+            </a:ext>
+          </a:extLst>
+        </p:spPr>
+      </p:pic>
+      <p:pic>
+        <p:nvPicPr>
+          <p:cNvPr id="1036" name="Picture 12" descr="Flask SVG Vector Logos - Vector Logo Zone">
+            <a:extLst>
+              <a:ext uri="{FF2B5EF4-FFF2-40B4-BE49-F238E27FC236}">
+                <a16:creationId xmlns:a16="http://schemas.microsoft.com/office/drawing/2014/main" id="{9742C27E-C87C-1B30-A3C9-E7F24E4C298E}"/>
+              </a:ext>
+            </a:extLst>
+          </p:cNvPr>
+          <p:cNvPicPr>
+            <a:picLocks noChangeAspect="1" noChangeArrowheads="1"/>
+          </p:cNvPicPr>
+          <p:nvPr/>
+        </p:nvPicPr>
+        <p:blipFill>
+          <a:blip r:embed="rId7">
+            <a:extLst>
+              <a:ext uri="{28A0092B-C50C-407E-A947-70E740481C1C}">
+                <a14:useLocalDpi xmlns:a14="http://schemas.microsoft.com/office/drawing/2010/main" val="0"/>
+              </a:ext>
+            </a:extLst>
+          </a:blip>
+          <a:srcRect/>
+          <a:stretch>
+            <a:fillRect/>
+          </a:stretch>
+        </p:blipFill>
+        <p:spPr bwMode="auto">
+          <a:xfrm>
+            <a:off x="7570656" y="655273"/>
+            <a:ext cx="972704" cy="486352"/>
+          </a:xfrm>
+          <a:prstGeom prst="rect">
+            <a:avLst/>
+          </a:prstGeom>
+          <a:noFill/>
+          <a:extLst>
+            <a:ext uri="{909E8E84-426E-40DD-AFC4-6F175D3DCCD1}">
+              <a14:hiddenFill xmlns:a14="http://schemas.microsoft.com/office/drawing/2010/main">
+                <a:solidFill>
+                  <a:srgbClr val="FFFFFF"/>
+                </a:solidFill>
+              </a14:hiddenFill>
+            </a:ext>
+          </a:extLst>
+        </p:spPr>
+      </p:pic>
+      <p:pic>
+        <p:nvPicPr>
+          <p:cNvPr id="1038" name="Picture 14">
+            <a:extLst>
+              <a:ext uri="{FF2B5EF4-FFF2-40B4-BE49-F238E27FC236}">
+                <a16:creationId xmlns:a16="http://schemas.microsoft.com/office/drawing/2014/main" id="{3F1ED640-7A77-D985-D4B0-0EDE65C9BA61}"/>
+              </a:ext>
+            </a:extLst>
+          </p:cNvPr>
+          <p:cNvPicPr>
+            <a:picLocks noChangeAspect="1" noChangeArrowheads="1"/>
+          </p:cNvPicPr>
+          <p:nvPr/>
+        </p:nvPicPr>
+        <p:blipFill rotWithShape="1">
+          <a:blip r:embed="rId8">
+            <a:extLst>
+              <a:ext uri="{28A0092B-C50C-407E-A947-70E740481C1C}">
+                <a14:useLocalDpi xmlns:a14="http://schemas.microsoft.com/office/drawing/2010/main" val="0"/>
+              </a:ext>
+            </a:extLst>
+          </a:blip>
+          <a:srcRect r="3926"/>
+          <a:stretch/>
+        </p:blipFill>
+        <p:spPr bwMode="auto">
+          <a:xfrm>
+            <a:off x="8728400" y="698483"/>
+            <a:ext cx="1425550" cy="399933"/>
+          </a:xfrm>
+          <a:prstGeom prst="rect">
+            <a:avLst/>
+          </a:prstGeom>
+          <a:noFill/>
+          <a:extLst>
+            <a:ext uri="{909E8E84-426E-40DD-AFC4-6F175D3DCCD1}">
+              <a14:hiddenFill xmlns:a14="http://schemas.microsoft.com/office/drawing/2010/main">
+                <a:solidFill>
+                  <a:srgbClr val="FFFFFF"/>
+                </a:solidFill>
+              </a14:hiddenFill>
+            </a:ext>
+          </a:extLst>
+        </p:spPr>
+      </p:pic>
+      <p:pic>
+        <p:nvPicPr>
+          <p:cNvPr id="1042" name="Picture 18" descr="Karma - CI/CD Tools Universe">
+            <a:extLst>
+              <a:ext uri="{FF2B5EF4-FFF2-40B4-BE49-F238E27FC236}">
+                <a16:creationId xmlns:a16="http://schemas.microsoft.com/office/drawing/2014/main" id="{EFA57BDC-DCE1-AC0F-BBDD-8A06E5637DD1}"/>
+              </a:ext>
+            </a:extLst>
+          </p:cNvPr>
+          <p:cNvPicPr>
+            <a:picLocks noChangeAspect="1" noChangeArrowheads="1"/>
+          </p:cNvPicPr>
+          <p:nvPr/>
+        </p:nvPicPr>
+        <p:blipFill rotWithShape="1">
+          <a:blip r:embed="rId9">
+            <a:extLst>
+              <a:ext uri="{28A0092B-C50C-407E-A947-70E740481C1C}">
+                <a14:useLocalDpi xmlns:a14="http://schemas.microsoft.com/office/drawing/2010/main" val="0"/>
+              </a:ext>
+            </a:extLst>
+          </a:blip>
+          <a:srcRect t="30667" b="30667"/>
+          <a:stretch/>
+        </p:blipFill>
+        <p:spPr bwMode="auto">
+          <a:xfrm>
+            <a:off x="661263" y="1316873"/>
+            <a:ext cx="1336170" cy="344435"/>
+          </a:xfrm>
+          <a:prstGeom prst="rect">
+            <a:avLst/>
+          </a:prstGeom>
+          <a:noFill/>
+          <a:extLst>
+            <a:ext uri="{909E8E84-426E-40DD-AFC4-6F175D3DCCD1}">
+              <a14:hiddenFill xmlns:a14="http://schemas.microsoft.com/office/drawing/2010/main">
+                <a:solidFill>
+                  <a:srgbClr val="FFFFFF"/>
+                </a:solidFill>
+              </a14:hiddenFill>
+            </a:ext>
+          </a:extLst>
+        </p:spPr>
+      </p:pic>
+      <p:pic>
+        <p:nvPicPr>
+          <p:cNvPr id="1044" name="Picture 20" descr="Eslint logo - Social media &amp; Logos Icons">
+            <a:extLst>
+              <a:ext uri="{FF2B5EF4-FFF2-40B4-BE49-F238E27FC236}">
+                <a16:creationId xmlns:a16="http://schemas.microsoft.com/office/drawing/2014/main" id="{AEE4F0BE-645D-7014-9EF2-33F7F3CF3076}"/>
+              </a:ext>
+            </a:extLst>
+          </p:cNvPr>
+          <p:cNvPicPr>
+            <a:picLocks noChangeAspect="1" noChangeArrowheads="1"/>
+          </p:cNvPicPr>
+          <p:nvPr/>
+        </p:nvPicPr>
+        <p:blipFill>
+          <a:blip r:embed="rId10">
+            <a:extLst>
+              <a:ext uri="{28A0092B-C50C-407E-A947-70E740481C1C}">
+                <a14:useLocalDpi xmlns:a14="http://schemas.microsoft.com/office/drawing/2010/main" val="0"/>
+              </a:ext>
+            </a:extLst>
+          </a:blip>
+          <a:srcRect/>
+          <a:stretch>
+            <a:fillRect/>
+          </a:stretch>
+        </p:blipFill>
+        <p:spPr bwMode="auto">
+          <a:xfrm>
+            <a:off x="2071656" y="1196508"/>
+            <a:ext cx="1170330" cy="585165"/>
+          </a:xfrm>
+          <a:prstGeom prst="rect">
+            <a:avLst/>
+          </a:prstGeom>
+          <a:noFill/>
+          <a:extLst>
+            <a:ext uri="{909E8E84-426E-40DD-AFC4-6F175D3DCCD1}">
+              <a14:hiddenFill xmlns:a14="http://schemas.microsoft.com/office/drawing/2010/main">
+                <a:solidFill>
+                  <a:srgbClr val="FFFFFF"/>
+                </a:solidFill>
+              </a14:hiddenFill>
+            </a:ext>
+          </a:extLst>
+        </p:spPr>
+      </p:pic>
+      <p:pic>
+        <p:nvPicPr>
+          <p:cNvPr id="1046" name="Picture 22" descr="Effortless Code Formatting: Setting Up Prettier with Next.js 13 | by Daniel  Craciun | Stackademic">
+            <a:extLst>
+              <a:ext uri="{FF2B5EF4-FFF2-40B4-BE49-F238E27FC236}">
+                <a16:creationId xmlns:a16="http://schemas.microsoft.com/office/drawing/2014/main" id="{3D3923CB-4A32-3534-5356-4C7F911C4E69}"/>
+              </a:ext>
+            </a:extLst>
+          </p:cNvPr>
+          <p:cNvPicPr>
+            <a:picLocks noChangeAspect="1" noChangeArrowheads="1"/>
+          </p:cNvPicPr>
+          <p:nvPr/>
+        </p:nvPicPr>
+        <p:blipFill rotWithShape="1">
+          <a:blip r:embed="rId11">
+            <a:extLst>
+              <a:ext uri="{28A0092B-C50C-407E-A947-70E740481C1C}">
+                <a14:useLocalDpi xmlns:a14="http://schemas.microsoft.com/office/drawing/2010/main" val="0"/>
+              </a:ext>
+            </a:extLst>
+          </a:blip>
+          <a:srcRect l="10347" t="21452" r="8310" b="21452"/>
+          <a:stretch/>
+        </p:blipFill>
+        <p:spPr bwMode="auto">
+          <a:xfrm>
+            <a:off x="3316209" y="1287319"/>
+            <a:ext cx="1379786" cy="403542"/>
+          </a:xfrm>
+          <a:prstGeom prst="rect">
+            <a:avLst/>
+          </a:prstGeom>
+          <a:noFill/>
+          <a:extLst>
+            <a:ext uri="{909E8E84-426E-40DD-AFC4-6F175D3DCCD1}">
+              <a14:hiddenFill xmlns:a14="http://schemas.microsoft.com/office/drawing/2010/main">
+                <a:solidFill>
+                  <a:srgbClr val="FFFFFF"/>
+                </a:solidFill>
+              </a14:hiddenFill>
+            </a:ext>
+          </a:extLst>
+        </p:spPr>
+      </p:pic>
+      <p:pic>
+        <p:nvPicPr>
+          <p:cNvPr id="7" name="Picture 24" descr="Testing with Mocha - DEV Community">
+            <a:extLst>
+              <a:ext uri="{FF2B5EF4-FFF2-40B4-BE49-F238E27FC236}">
+                <a16:creationId xmlns:a16="http://schemas.microsoft.com/office/drawing/2014/main" id="{44CA3BB6-3237-388C-AEDA-D9F25FA1BD6B}"/>
+              </a:ext>
+            </a:extLst>
+          </p:cNvPr>
+          <p:cNvPicPr>
+            <a:picLocks noChangeAspect="1" noChangeArrowheads="1"/>
+          </p:cNvPicPr>
+          <p:nvPr/>
+        </p:nvPicPr>
+        <p:blipFill rotWithShape="1">
+          <a:blip r:embed="rId12">
+            <a:extLst>
+              <a:ext uri="{28A0092B-C50C-407E-A947-70E740481C1C}">
+                <a14:useLocalDpi xmlns:a14="http://schemas.microsoft.com/office/drawing/2010/main" val="0"/>
+              </a:ext>
+            </a:extLst>
+          </a:blip>
+          <a:srcRect l="13359" r="50105"/>
+          <a:stretch/>
+        </p:blipFill>
+        <p:spPr bwMode="auto">
+          <a:xfrm>
+            <a:off x="4770218" y="1213120"/>
+            <a:ext cx="480135" cy="551941"/>
+          </a:xfrm>
+          <a:prstGeom prst="rect">
+            <a:avLst/>
+          </a:prstGeom>
+          <a:noFill/>
+          <a:extLst>
+            <a:ext uri="{909E8E84-426E-40DD-AFC4-6F175D3DCCD1}">
+              <a14:hiddenFill xmlns:a14="http://schemas.microsoft.com/office/drawing/2010/main">
+                <a:solidFill>
+                  <a:srgbClr val="FFFFFF"/>
+                </a:solidFill>
+              </a14:hiddenFill>
+            </a:ext>
+          </a:extLst>
+        </p:spPr>
+      </p:pic>
+      <p:pic>
+        <p:nvPicPr>
+          <p:cNvPr id="1050" name="Picture 26" descr="Istanbul Code Coverage · GitHub">
+            <a:extLst>
+              <a:ext uri="{FF2B5EF4-FFF2-40B4-BE49-F238E27FC236}">
+                <a16:creationId xmlns:a16="http://schemas.microsoft.com/office/drawing/2014/main" id="{5DCA72F5-6E8B-63DA-5742-549D90CA4D25}"/>
+              </a:ext>
+            </a:extLst>
+          </p:cNvPr>
+          <p:cNvPicPr>
+            <a:picLocks noChangeAspect="1" noChangeArrowheads="1"/>
+          </p:cNvPicPr>
+          <p:nvPr/>
+        </p:nvPicPr>
+        <p:blipFill>
+          <a:blip r:embed="rId13">
+            <a:extLst>
+              <a:ext uri="{28A0092B-C50C-407E-A947-70E740481C1C}">
+                <a14:useLocalDpi xmlns:a14="http://schemas.microsoft.com/office/drawing/2010/main" val="0"/>
+              </a:ext>
+            </a:extLst>
+          </a:blip>
+          <a:srcRect/>
+          <a:stretch>
+            <a:fillRect/>
+          </a:stretch>
+        </p:blipFill>
+        <p:spPr bwMode="auto">
+          <a:xfrm>
+            <a:off x="5878934" y="1236293"/>
+            <a:ext cx="505594" cy="505594"/>
+          </a:xfrm>
+          <a:prstGeom prst="rect">
+            <a:avLst/>
+          </a:prstGeom>
+          <a:noFill/>
+          <a:extLst>
+            <a:ext uri="{909E8E84-426E-40DD-AFC4-6F175D3DCCD1}">
+              <a14:hiddenFill xmlns:a14="http://schemas.microsoft.com/office/drawing/2010/main">
+                <a:solidFill>
+                  <a:srgbClr val="FFFFFF"/>
+                </a:solidFill>
+              </a14:hiddenFill>
+            </a:ext>
+          </a:extLst>
+        </p:spPr>
+      </p:pic>
+      <p:pic>
+        <p:nvPicPr>
+          <p:cNvPr id="1052" name="Picture 28" descr="Pytest - Testmo Integrations">
+            <a:extLst>
+              <a:ext uri="{FF2B5EF4-FFF2-40B4-BE49-F238E27FC236}">
+                <a16:creationId xmlns:a16="http://schemas.microsoft.com/office/drawing/2014/main" id="{D106BD31-4654-A637-D7B3-C72D4D977563}"/>
+              </a:ext>
+            </a:extLst>
+          </p:cNvPr>
+          <p:cNvPicPr>
+            <a:picLocks noChangeAspect="1" noChangeArrowheads="1"/>
+          </p:cNvPicPr>
+          <p:nvPr/>
+        </p:nvPicPr>
+        <p:blipFill>
+          <a:blip r:embed="rId14">
+            <a:extLst>
+              <a:ext uri="{28A0092B-C50C-407E-A947-70E740481C1C}">
+                <a14:useLocalDpi xmlns:a14="http://schemas.microsoft.com/office/drawing/2010/main" val="0"/>
+              </a:ext>
+            </a:extLst>
+          </a:blip>
+          <a:srcRect/>
+          <a:stretch>
+            <a:fillRect/>
+          </a:stretch>
+        </p:blipFill>
+        <p:spPr bwMode="auto">
+          <a:xfrm>
+            <a:off x="6458751" y="1283450"/>
+            <a:ext cx="1218606" cy="411280"/>
+          </a:xfrm>
+          <a:prstGeom prst="rect">
+            <a:avLst/>
+          </a:prstGeom>
+          <a:noFill/>
+          <a:extLst>
+            <a:ext uri="{909E8E84-426E-40DD-AFC4-6F175D3DCCD1}">
+              <a14:hiddenFill xmlns:a14="http://schemas.microsoft.com/office/drawing/2010/main">
+                <a:solidFill>
+                  <a:srgbClr val="FFFFFF"/>
+                </a:solidFill>
+              </a14:hiddenFill>
+            </a:ext>
+          </a:extLst>
+        </p:spPr>
+      </p:pic>
+      <p:pic>
+        <p:nvPicPr>
+          <p:cNvPr id="1054" name="Picture 30" descr="Using pylint to review your code. Pylint is a Python static code analysis…  | by Michael M Hansen | Vizneo Academy | Medium">
+            <a:extLst>
+              <a:ext uri="{FF2B5EF4-FFF2-40B4-BE49-F238E27FC236}">
+                <a16:creationId xmlns:a16="http://schemas.microsoft.com/office/drawing/2014/main" id="{F354E18A-EC9C-DBC4-5556-5CDDE62A9B8C}"/>
+              </a:ext>
+            </a:extLst>
+          </p:cNvPr>
+          <p:cNvPicPr>
+            <a:picLocks noChangeAspect="1" noChangeArrowheads="1"/>
+          </p:cNvPicPr>
+          <p:nvPr/>
+        </p:nvPicPr>
+        <p:blipFill rotWithShape="1">
+          <a:blip r:embed="rId15">
+            <a:extLst>
+              <a:ext uri="{28A0092B-C50C-407E-A947-70E740481C1C}">
+                <a14:useLocalDpi xmlns:a14="http://schemas.microsoft.com/office/drawing/2010/main" val="0"/>
+              </a:ext>
+            </a:extLst>
+          </a:blip>
+          <a:srcRect l="10326" t="25268" r="13043" b="10917"/>
+          <a:stretch/>
+        </p:blipFill>
+        <p:spPr bwMode="auto">
+          <a:xfrm>
+            <a:off x="7751580" y="1330561"/>
+            <a:ext cx="955236" cy="317058"/>
+          </a:xfrm>
+          <a:prstGeom prst="rect">
+            <a:avLst/>
+          </a:prstGeom>
+          <a:noFill/>
+          <a:extLst>
+            <a:ext uri="{909E8E84-426E-40DD-AFC4-6F175D3DCCD1}">
+              <a14:hiddenFill xmlns:a14="http://schemas.microsoft.com/office/drawing/2010/main">
+                <a:solidFill>
+                  <a:srgbClr val="FFFFFF"/>
+                </a:solidFill>
+              </a14:hiddenFill>
+            </a:ext>
+          </a:extLst>
+        </p:spPr>
+      </p:pic>
+      <p:pic>
+        <p:nvPicPr>
+          <p:cNvPr id="10" name="Picture 32" descr="GitHub - psf/black: The uncompromising Python code formatter">
+            <a:extLst>
+              <a:ext uri="{FF2B5EF4-FFF2-40B4-BE49-F238E27FC236}">
+                <a16:creationId xmlns:a16="http://schemas.microsoft.com/office/drawing/2014/main" id="{3B75BC01-F2E9-4247-B97A-D5DD7D937980}"/>
+              </a:ext>
+            </a:extLst>
+          </p:cNvPr>
+          <p:cNvPicPr>
+            <a:picLocks noChangeAspect="1" noChangeArrowheads="1"/>
+          </p:cNvPicPr>
+          <p:nvPr/>
+        </p:nvPicPr>
+        <p:blipFill rotWithShape="1">
+          <a:blip r:embed="rId16">
+            <a:extLst>
+              <a:ext uri="{28A0092B-C50C-407E-A947-70E740481C1C}">
+                <a14:useLocalDpi xmlns:a14="http://schemas.microsoft.com/office/drawing/2010/main" val="0"/>
+              </a:ext>
+            </a:extLst>
+          </a:blip>
+          <a:srcRect l="25873" t="15455" r="25873" b="15455"/>
+          <a:stretch/>
+        </p:blipFill>
+        <p:spPr bwMode="auto">
+          <a:xfrm>
+            <a:off x="8781039" y="1283523"/>
+            <a:ext cx="783112" cy="411134"/>
+          </a:xfrm>
+          <a:prstGeom prst="rect">
+            <a:avLst/>
+          </a:prstGeom>
+          <a:noFill/>
+          <a:extLst>
+            <a:ext uri="{909E8E84-426E-40DD-AFC4-6F175D3DCCD1}">
+              <a14:hiddenFill xmlns:a14="http://schemas.microsoft.com/office/drawing/2010/main">
+                <a:solidFill>
+                  <a:srgbClr val="FFFFFF"/>
+                </a:solidFill>
+              </a14:hiddenFill>
+            </a:ext>
+          </a:extLst>
+        </p:spPr>
+      </p:pic>
+      <p:pic>
+        <p:nvPicPr>
+          <p:cNvPr id="1058" name="Picture 34" descr="ASP.NET Core Swagger UI Authorization using IdentityServer4">
+            <a:extLst>
+              <a:ext uri="{FF2B5EF4-FFF2-40B4-BE49-F238E27FC236}">
+                <a16:creationId xmlns:a16="http://schemas.microsoft.com/office/drawing/2014/main" id="{3FB41A05-6B1A-A903-08FC-491591193729}"/>
+              </a:ext>
+            </a:extLst>
+          </p:cNvPr>
+          <p:cNvPicPr>
+            <a:picLocks noChangeAspect="1" noChangeArrowheads="1"/>
+          </p:cNvPicPr>
+          <p:nvPr/>
+        </p:nvPicPr>
+        <p:blipFill rotWithShape="1">
+          <a:blip r:embed="rId17">
+            <a:extLst>
+              <a:ext uri="{28A0092B-C50C-407E-A947-70E740481C1C}">
+                <a14:useLocalDpi xmlns:a14="http://schemas.microsoft.com/office/drawing/2010/main" val="0"/>
+              </a:ext>
+            </a:extLst>
+          </a:blip>
+          <a:srcRect r="3183"/>
+          <a:stretch/>
+        </p:blipFill>
+        <p:spPr bwMode="auto">
+          <a:xfrm>
+            <a:off x="605735" y="1854132"/>
+            <a:ext cx="1334424" cy="385854"/>
+          </a:xfrm>
+          <a:prstGeom prst="rect">
+            <a:avLst/>
+          </a:prstGeom>
+          <a:noFill/>
+          <a:extLst>
+            <a:ext uri="{909E8E84-426E-40DD-AFC4-6F175D3DCCD1}">
+              <a14:hiddenFill xmlns:a14="http://schemas.microsoft.com/office/drawing/2010/main">
+                <a:solidFill>
+                  <a:srgbClr val="FFFFFF"/>
+                </a:solidFill>
+              </a14:hiddenFill>
+            </a:ext>
+          </a:extLst>
+        </p:spPr>
+      </p:pic>
+      <p:pic>
+        <p:nvPicPr>
+          <p:cNvPr id="1060" name="Picture 36" descr="Logo, Icon, and Brand Guidelines | Docker">
+            <a:extLst>
+              <a:ext uri="{FF2B5EF4-FFF2-40B4-BE49-F238E27FC236}">
+                <a16:creationId xmlns:a16="http://schemas.microsoft.com/office/drawing/2014/main" id="{E440F29A-071A-62AD-3EE2-DFC8338F163E}"/>
+              </a:ext>
+            </a:extLst>
+          </p:cNvPr>
+          <p:cNvPicPr>
+            <a:picLocks noChangeAspect="1" noChangeArrowheads="1"/>
+          </p:cNvPicPr>
+          <p:nvPr/>
+        </p:nvPicPr>
+        <p:blipFill rotWithShape="1">
+          <a:blip r:embed="rId18">
+            <a:extLst>
+              <a:ext uri="{28A0092B-C50C-407E-A947-70E740481C1C}">
+                <a14:useLocalDpi xmlns:a14="http://schemas.microsoft.com/office/drawing/2010/main" val="0"/>
+              </a:ext>
+            </a:extLst>
+          </a:blip>
+          <a:srcRect l="12424" t="32514" r="12424" b="32514"/>
+          <a:stretch/>
+        </p:blipFill>
+        <p:spPr bwMode="auto">
+          <a:xfrm>
+            <a:off x="2077091" y="1832902"/>
+            <a:ext cx="1383101" cy="428315"/>
+          </a:xfrm>
+          <a:prstGeom prst="rect">
+            <a:avLst/>
+          </a:prstGeom>
+          <a:noFill/>
+          <a:extLst>
+            <a:ext uri="{909E8E84-426E-40DD-AFC4-6F175D3DCCD1}">
+              <a14:hiddenFill xmlns:a14="http://schemas.microsoft.com/office/drawing/2010/main">
+                <a:solidFill>
+                  <a:srgbClr val="FFFFFF"/>
+                </a:solidFill>
+              </a14:hiddenFill>
+            </a:ext>
+          </a:extLst>
+        </p:spPr>
+      </p:pic>
+      <p:pic>
+        <p:nvPicPr>
+          <p:cNvPr id="1062" name="Picture 38" descr="Docker Compose - an orchestration tool for spinning up multi-container  distributed applications with Docker">
+            <a:extLst>
+              <a:ext uri="{FF2B5EF4-FFF2-40B4-BE49-F238E27FC236}">
+                <a16:creationId xmlns:a16="http://schemas.microsoft.com/office/drawing/2014/main" id="{15DE48B2-6B3D-E0F4-9E8F-14493CEEE7BD}"/>
+              </a:ext>
+            </a:extLst>
+          </p:cNvPr>
+          <p:cNvPicPr>
+            <a:picLocks noChangeAspect="1" noChangeArrowheads="1"/>
+          </p:cNvPicPr>
+          <p:nvPr/>
+        </p:nvPicPr>
+        <p:blipFill rotWithShape="1">
+          <a:blip r:embed="rId19">
+            <a:extLst>
+              <a:ext uri="{28A0092B-C50C-407E-A947-70E740481C1C}">
+                <a14:useLocalDpi xmlns:a14="http://schemas.microsoft.com/office/drawing/2010/main" val="0"/>
+              </a:ext>
+            </a:extLst>
+          </a:blip>
+          <a:srcRect l="6125" t="7617" r="6125" b="7617"/>
+          <a:stretch/>
+        </p:blipFill>
+        <p:spPr bwMode="auto">
+          <a:xfrm>
+            <a:off x="3541596" y="1735919"/>
+            <a:ext cx="1341120" cy="622280"/>
+          </a:xfrm>
+          <a:prstGeom prst="rect">
+            <a:avLst/>
+          </a:prstGeom>
+          <a:noFill/>
+          <a:extLst>
+            <a:ext uri="{909E8E84-426E-40DD-AFC4-6F175D3DCCD1}">
+              <a14:hiddenFill xmlns:a14="http://schemas.microsoft.com/office/drawing/2010/main">
+                <a:solidFill>
+                  <a:srgbClr val="FFFFFF"/>
+                </a:solidFill>
+              </a14:hiddenFill>
+            </a:ext>
+          </a:extLst>
+        </p:spPr>
+      </p:pic>
+      <p:pic>
+        <p:nvPicPr>
+          <p:cNvPr id="1064" name="Picture 40">
+            <a:extLst>
+              <a:ext uri="{FF2B5EF4-FFF2-40B4-BE49-F238E27FC236}">
+                <a16:creationId xmlns:a16="http://schemas.microsoft.com/office/drawing/2014/main" id="{42C2C2B4-477C-86E5-94C4-A7EB06B0AB0A}"/>
+              </a:ext>
+            </a:extLst>
+          </p:cNvPr>
+          <p:cNvPicPr>
+            <a:picLocks noChangeAspect="1" noChangeArrowheads="1"/>
+          </p:cNvPicPr>
+          <p:nvPr/>
+        </p:nvPicPr>
+        <p:blipFill>
+          <a:blip r:embed="rId20">
+            <a:extLst>
+              <a:ext uri="{28A0092B-C50C-407E-A947-70E740481C1C}">
+                <a14:useLocalDpi xmlns:a14="http://schemas.microsoft.com/office/drawing/2010/main" val="0"/>
+              </a:ext>
+            </a:extLst>
+          </a:blip>
+          <a:srcRect/>
+          <a:stretch>
+            <a:fillRect/>
+          </a:stretch>
+        </p:blipFill>
+        <p:spPr bwMode="auto">
+          <a:xfrm>
+            <a:off x="4964120" y="1890633"/>
+            <a:ext cx="1767992" cy="312852"/>
+          </a:xfrm>
+          <a:prstGeom prst="rect">
+            <a:avLst/>
+          </a:prstGeom>
+          <a:noFill/>
+          <a:extLst>
+            <a:ext uri="{909E8E84-426E-40DD-AFC4-6F175D3DCCD1}">
+              <a14:hiddenFill xmlns:a14="http://schemas.microsoft.com/office/drawing/2010/main">
+                <a:solidFill>
+                  <a:srgbClr val="FFFFFF"/>
+                </a:solidFill>
+              </a14:hiddenFill>
+            </a:ext>
+          </a:extLst>
+        </p:spPr>
+      </p:pic>
+      <p:pic>
+        <p:nvPicPr>
+          <p:cNvPr id="1066" name="Picture 42" descr="Helm logo transparent PNG - StickPNG">
+            <a:extLst>
+              <a:ext uri="{FF2B5EF4-FFF2-40B4-BE49-F238E27FC236}">
+                <a16:creationId xmlns:a16="http://schemas.microsoft.com/office/drawing/2014/main" id="{99141B55-61E9-5F92-5AFA-9CFF79FE68AC}"/>
+              </a:ext>
+            </a:extLst>
+          </p:cNvPr>
+          <p:cNvPicPr>
+            <a:picLocks noChangeAspect="1" noChangeArrowheads="1"/>
+          </p:cNvPicPr>
+          <p:nvPr/>
+        </p:nvPicPr>
+        <p:blipFill>
+          <a:blip r:embed="rId21">
+            <a:extLst>
+              <a:ext uri="{28A0092B-C50C-407E-A947-70E740481C1C}">
+                <a14:useLocalDpi xmlns:a14="http://schemas.microsoft.com/office/drawing/2010/main" val="0"/>
+              </a:ext>
+            </a:extLst>
+          </a:blip>
+          <a:srcRect/>
+          <a:stretch>
+            <a:fillRect/>
+          </a:stretch>
+        </p:blipFill>
+        <p:spPr bwMode="auto">
+          <a:xfrm>
+            <a:off x="6813516" y="1803095"/>
+            <a:ext cx="504358" cy="487928"/>
+          </a:xfrm>
+          <a:prstGeom prst="rect">
+            <a:avLst/>
+          </a:prstGeom>
+          <a:noFill/>
+          <a:extLst>
+            <a:ext uri="{909E8E84-426E-40DD-AFC4-6F175D3DCCD1}">
+              <a14:hiddenFill xmlns:a14="http://schemas.microsoft.com/office/drawing/2010/main">
+                <a:solidFill>
+                  <a:srgbClr val="FFFFFF"/>
+                </a:solidFill>
+              </a14:hiddenFill>
+            </a:ext>
+          </a:extLst>
+        </p:spPr>
+      </p:pic>
+      <p:pic>
+        <p:nvPicPr>
+          <p:cNvPr id="1068" name="Picture 44">
+            <a:extLst>
+              <a:ext uri="{FF2B5EF4-FFF2-40B4-BE49-F238E27FC236}">
+                <a16:creationId xmlns:a16="http://schemas.microsoft.com/office/drawing/2014/main" id="{CFE7AC09-15BC-E46B-6FCB-A2B7D236917B}"/>
+              </a:ext>
+            </a:extLst>
+          </p:cNvPr>
+          <p:cNvPicPr>
+            <a:picLocks noChangeAspect="1" noChangeArrowheads="1"/>
+          </p:cNvPicPr>
+          <p:nvPr/>
+        </p:nvPicPr>
+        <p:blipFill>
+          <a:blip r:embed="rId22">
+            <a:extLst>
+              <a:ext uri="{28A0092B-C50C-407E-A947-70E740481C1C}">
+                <a14:useLocalDpi xmlns:a14="http://schemas.microsoft.com/office/drawing/2010/main" val="0"/>
+              </a:ext>
+            </a:extLst>
+          </a:blip>
+          <a:srcRect/>
+          <a:stretch>
+            <a:fillRect/>
+          </a:stretch>
+        </p:blipFill>
+        <p:spPr bwMode="auto">
+          <a:xfrm>
+            <a:off x="7399278" y="1917989"/>
+            <a:ext cx="1668790" cy="258140"/>
+          </a:xfrm>
+          <a:prstGeom prst="rect">
+            <a:avLst/>
+          </a:prstGeom>
+          <a:noFill/>
+          <a:extLst>
+            <a:ext uri="{909E8E84-426E-40DD-AFC4-6F175D3DCCD1}">
+              <a14:hiddenFill xmlns:a14="http://schemas.microsoft.com/office/drawing/2010/main">
+                <a:solidFill>
+                  <a:srgbClr val="FFFFFF"/>
+                </a:solidFill>
+              </a14:hiddenFill>
+            </a:ext>
+          </a:extLst>
+        </p:spPr>
+      </p:pic>
+      <p:pic>
+        <p:nvPicPr>
+          <p:cNvPr id="1070" name="Picture 46" descr="Google Kubernetes Engine">
+            <a:extLst>
+              <a:ext uri="{FF2B5EF4-FFF2-40B4-BE49-F238E27FC236}">
+                <a16:creationId xmlns:a16="http://schemas.microsoft.com/office/drawing/2014/main" id="{C5AD8033-8499-C06A-958D-25DC529A2699}"/>
+              </a:ext>
+            </a:extLst>
+          </p:cNvPr>
+          <p:cNvPicPr>
+            <a:picLocks noChangeAspect="1" noChangeArrowheads="1"/>
+          </p:cNvPicPr>
+          <p:nvPr/>
+        </p:nvPicPr>
+        <p:blipFill>
+          <a:blip r:embed="rId23">
+            <a:extLst>
+              <a:ext uri="{28A0092B-C50C-407E-A947-70E740481C1C}">
+                <a14:useLocalDpi xmlns:a14="http://schemas.microsoft.com/office/drawing/2010/main" val="0"/>
+              </a:ext>
+            </a:extLst>
+          </a:blip>
+          <a:srcRect/>
+          <a:stretch>
+            <a:fillRect/>
+          </a:stretch>
+        </p:blipFill>
+        <p:spPr bwMode="auto">
+          <a:xfrm>
+            <a:off x="9149472" y="1754959"/>
+            <a:ext cx="1007830" cy="584200"/>
+          </a:xfrm>
+          <a:prstGeom prst="rect">
+            <a:avLst/>
+          </a:prstGeom>
+          <a:noFill/>
+          <a:extLst>
+            <a:ext uri="{909E8E84-426E-40DD-AFC4-6F175D3DCCD1}">
+              <a14:hiddenFill xmlns:a14="http://schemas.microsoft.com/office/drawing/2010/main">
+                <a:solidFill>
+                  <a:srgbClr val="FFFFFF"/>
+                </a:solidFill>
+              </a14:hiddenFill>
+            </a:ext>
+          </a:extLst>
+        </p:spPr>
+      </p:pic>
+      <p:pic>
+        <p:nvPicPr>
+          <p:cNvPr id="1072" name="Picture 48" descr="Terraform – Altinn">
+            <a:extLst>
+              <a:ext uri="{FF2B5EF4-FFF2-40B4-BE49-F238E27FC236}">
+                <a16:creationId xmlns:a16="http://schemas.microsoft.com/office/drawing/2014/main" id="{0C159116-7114-DDE0-324A-47B8C0C93251}"/>
+              </a:ext>
+            </a:extLst>
+          </p:cNvPr>
+          <p:cNvPicPr>
+            <a:picLocks noChangeAspect="1" noChangeArrowheads="1"/>
+          </p:cNvPicPr>
+          <p:nvPr/>
+        </p:nvPicPr>
+        <p:blipFill rotWithShape="1">
+          <a:blip r:embed="rId24">
+            <a:extLst>
+              <a:ext uri="{28A0092B-C50C-407E-A947-70E740481C1C}">
+                <a14:useLocalDpi xmlns:a14="http://schemas.microsoft.com/office/drawing/2010/main" val="0"/>
+              </a:ext>
+            </a:extLst>
+          </a:blip>
+          <a:srcRect t="11479" b="11479"/>
+          <a:stretch/>
+        </p:blipFill>
+        <p:spPr bwMode="auto">
+          <a:xfrm>
+            <a:off x="10238709" y="1864090"/>
+            <a:ext cx="1636056" cy="365938"/>
+          </a:xfrm>
+          <a:prstGeom prst="rect">
+            <a:avLst/>
+          </a:prstGeom>
+          <a:noFill/>
+          <a:extLst>
+            <a:ext uri="{909E8E84-426E-40DD-AFC4-6F175D3DCCD1}">
+              <a14:hiddenFill xmlns:a14="http://schemas.microsoft.com/office/drawing/2010/main">
+                <a:solidFill>
+                  <a:srgbClr val="FFFFFF"/>
+                </a:solidFill>
+              </a14:hiddenFill>
+            </a:ext>
+          </a:extLst>
+        </p:spPr>
+      </p:pic>
+      <p:pic>
+        <p:nvPicPr>
+          <p:cNvPr id="1074" name="Picture 50" descr="Autodesk Sketchbook Software, Free trial &amp; download available">
+            <a:extLst>
+              <a:ext uri="{FF2B5EF4-FFF2-40B4-BE49-F238E27FC236}">
+                <a16:creationId xmlns:a16="http://schemas.microsoft.com/office/drawing/2014/main" id="{AE3D1644-ED54-EADE-FCA6-B5281BD07A2E}"/>
+              </a:ext>
+            </a:extLst>
+          </p:cNvPr>
+          <p:cNvPicPr>
+            <a:picLocks noChangeAspect="1" noChangeArrowheads="1"/>
+          </p:cNvPicPr>
+          <p:nvPr/>
+        </p:nvPicPr>
+        <p:blipFill rotWithShape="1">
+          <a:blip r:embed="rId25">
+            <a:extLst>
+              <a:ext uri="{28A0092B-C50C-407E-A947-70E740481C1C}">
+                <a14:useLocalDpi xmlns:a14="http://schemas.microsoft.com/office/drawing/2010/main" val="0"/>
+              </a:ext>
+            </a:extLst>
+          </a:blip>
+          <a:srcRect t="24353" b="24353"/>
+          <a:stretch/>
+        </p:blipFill>
+        <p:spPr bwMode="auto">
+          <a:xfrm>
+            <a:off x="10338987" y="682807"/>
+            <a:ext cx="1535778" cy="431284"/>
+          </a:xfrm>
+          <a:prstGeom prst="rect">
+            <a:avLst/>
+          </a:prstGeom>
+          <a:noFill/>
+          <a:extLst>
+            <a:ext uri="{909E8E84-426E-40DD-AFC4-6F175D3DCCD1}">
+              <a14:hiddenFill xmlns:a14="http://schemas.microsoft.com/office/drawing/2010/main">
+                <a:solidFill>
+                  <a:srgbClr val="FFFFFF"/>
+                </a:solidFill>
+              </a14:hiddenFill>
+            </a:ext>
+          </a:extLst>
+        </p:spPr>
+      </p:pic>
+      <p:pic>
+        <p:nvPicPr>
+          <p:cNvPr id="15" name="Picture 24" descr="Testing with Mocha - DEV Community">
+            <a:extLst>
+              <a:ext uri="{FF2B5EF4-FFF2-40B4-BE49-F238E27FC236}">
+                <a16:creationId xmlns:a16="http://schemas.microsoft.com/office/drawing/2014/main" id="{7D84ACD8-14A7-5AA9-BA0C-CD3BC53D659C}"/>
+              </a:ext>
+            </a:extLst>
+          </p:cNvPr>
+          <p:cNvPicPr>
+            <a:picLocks noChangeAspect="1" noChangeArrowheads="1"/>
+          </p:cNvPicPr>
+          <p:nvPr/>
+        </p:nvPicPr>
+        <p:blipFill rotWithShape="1">
+          <a:blip r:embed="rId12">
+            <a:extLst>
+              <a:ext uri="{28A0092B-C50C-407E-A947-70E740481C1C}">
+                <a14:useLocalDpi xmlns:a14="http://schemas.microsoft.com/office/drawing/2010/main" val="0"/>
+              </a:ext>
+            </a:extLst>
+          </a:blip>
+          <a:srcRect l="50105" r="13359"/>
+          <a:stretch/>
+        </p:blipFill>
+        <p:spPr bwMode="auto">
+          <a:xfrm>
+            <a:off x="5324576" y="1213120"/>
+            <a:ext cx="480135" cy="551941"/>
+          </a:xfrm>
+          <a:prstGeom prst="rect">
+            <a:avLst/>
+          </a:prstGeom>
+          <a:noFill/>
+          <a:extLst>
+            <a:ext uri="{909E8E84-426E-40DD-AFC4-6F175D3DCCD1}">
+              <a14:hiddenFill xmlns:a14="http://schemas.microsoft.com/office/drawing/2010/main">
+                <a:solidFill>
+                  <a:srgbClr val="FFFFFF"/>
+                </a:solidFill>
+              </a14:hiddenFill>
+            </a:ext>
+          </a:extLst>
+        </p:spPr>
+      </p:pic>
+      <p:pic>
+        <p:nvPicPr>
+          <p:cNvPr id="2" name="Picture 2" descr="Test coverage reports with Codecov - Antonshell">
+            <a:extLst>
+              <a:ext uri="{FF2B5EF4-FFF2-40B4-BE49-F238E27FC236}">
+                <a16:creationId xmlns:a16="http://schemas.microsoft.com/office/drawing/2014/main" id="{6EDED196-1AB1-9AD6-AE06-FFF60959F10D}"/>
+              </a:ext>
+            </a:extLst>
+          </p:cNvPr>
+          <p:cNvPicPr>
+            <a:picLocks noChangeAspect="1" noChangeArrowheads="1"/>
+          </p:cNvPicPr>
+          <p:nvPr/>
+        </p:nvPicPr>
+        <p:blipFill rotWithShape="1">
+          <a:blip r:embed="rId26">
+            <a:extLst>
+              <a:ext uri="{28A0092B-C50C-407E-A947-70E740481C1C}">
+                <a14:useLocalDpi xmlns:a14="http://schemas.microsoft.com/office/drawing/2010/main" val="0"/>
+              </a:ext>
+            </a:extLst>
+          </a:blip>
+          <a:srcRect l="2629" r="2439"/>
+          <a:stretch/>
+        </p:blipFill>
+        <p:spPr bwMode="auto">
+          <a:xfrm>
+            <a:off x="9638374" y="1291298"/>
+            <a:ext cx="1264965" cy="395585"/>
+          </a:xfrm>
+          <a:prstGeom prst="rect">
+            <a:avLst/>
+          </a:prstGeom>
+          <a:noFill/>
+          <a:extLst>
+            <a:ext uri="{909E8E84-426E-40DD-AFC4-6F175D3DCCD1}">
+              <a14:hiddenFill xmlns:a14="http://schemas.microsoft.com/office/drawing/2010/main">
+                <a:solidFill>
+                  <a:srgbClr val="FFFFFF"/>
+                </a:solidFill>
+              </a14:hiddenFill>
+            </a:ext>
+          </a:extLst>
+        </p:spPr>
+      </p:pic>
+      <p:pic>
+        <p:nvPicPr>
+          <p:cNvPr id="3074" name="Picture 2" descr="Actions in Github. It has been a while now since Github… | by Dhruv Patel |  Treebo Tech Blog">
+            <a:extLst>
+              <a:ext uri="{FF2B5EF4-FFF2-40B4-BE49-F238E27FC236}">
+                <a16:creationId xmlns:a16="http://schemas.microsoft.com/office/drawing/2014/main" id="{0E14014F-DA06-5F67-4DBB-3EC8AB669A19}"/>
+              </a:ext>
+            </a:extLst>
+          </p:cNvPr>
+          <p:cNvPicPr>
+            <a:picLocks noChangeAspect="1" noChangeArrowheads="1"/>
+          </p:cNvPicPr>
+          <p:nvPr/>
+        </p:nvPicPr>
+        <p:blipFill rotWithShape="1">
+          <a:blip r:embed="rId27">
+            <a:extLst>
+              <a:ext uri="{28A0092B-C50C-407E-A947-70E740481C1C}">
+                <a14:useLocalDpi xmlns:a14="http://schemas.microsoft.com/office/drawing/2010/main" val="0"/>
+              </a:ext>
+            </a:extLst>
+          </a:blip>
+          <a:srcRect l="28505" r="20338"/>
+          <a:stretch/>
+        </p:blipFill>
+        <p:spPr bwMode="auto">
+          <a:xfrm>
+            <a:off x="10977563" y="1120790"/>
+            <a:ext cx="897201" cy="736600"/>
+          </a:xfrm>
+          <a:prstGeom prst="rect">
+            <a:avLst/>
+          </a:prstGeom>
+          <a:noFill/>
+          <a:extLst>
+            <a:ext uri="{909E8E84-426E-40DD-AFC4-6F175D3DCCD1}">
+              <a14:hiddenFill xmlns:a14="http://schemas.microsoft.com/office/drawing/2010/main">
+                <a:solidFill>
+                  <a:srgbClr val="FFFFFF"/>
+                </a:solidFill>
+              </a14:hiddenFill>
+            </a:ext>
+          </a:extLst>
+        </p:spPr>
+      </p:pic>
+    </p:spTree>
+    <p:extLst>
+      <p:ext uri="{BB962C8B-B14F-4D97-AF65-F5344CB8AC3E}">
+        <p14:creationId xmlns:p14="http://schemas.microsoft.com/office/powerpoint/2010/main" val="2992546878"/>
       </p:ext>
     </p:extLst>
   </p:cSld>

</xml_diff>